<commit_message>
The Lost Fleet Expansion (#17)
</commit_message>
<xml_diff>
--- a/resources/sector-map-indexes.pptx
+++ b/resources/sector-map-indexes.pptx
@@ -6,6 +6,7 @@
   </p:sldMasterIdLst>
   <p:sldIdLst>
     <p:sldId id="257" r:id="rId2"/>
+    <p:sldId id="258" r:id="rId3"/>
   </p:sldIdLst>
   <p:sldSz cx="12192000" cy="6858000"/>
   <p:notesSz cx="6858000" cy="9144000"/>
@@ -259,7 +260,7 @@
           <a:p>
             <a:fld id="{FE9F7F82-BB56-45F9-B170-0F8CF6DB2CC7}" type="datetimeFigureOut">
               <a:rPr lang="de-DE" smtClean="0"/>
-              <a:t>27.11.2024</a:t>
+              <a:t>28.11.2024</a:t>
             </a:fld>
             <a:endParaRPr lang="de-DE"/>
           </a:p>
@@ -457,7 +458,7 @@
           <a:p>
             <a:fld id="{FE9F7F82-BB56-45F9-B170-0F8CF6DB2CC7}" type="datetimeFigureOut">
               <a:rPr lang="de-DE" smtClean="0"/>
-              <a:t>27.11.2024</a:t>
+              <a:t>28.11.2024</a:t>
             </a:fld>
             <a:endParaRPr lang="de-DE"/>
           </a:p>
@@ -665,7 +666,7 @@
           <a:p>
             <a:fld id="{FE9F7F82-BB56-45F9-B170-0F8CF6DB2CC7}" type="datetimeFigureOut">
               <a:rPr lang="de-DE" smtClean="0"/>
-              <a:t>27.11.2024</a:t>
+              <a:t>28.11.2024</a:t>
             </a:fld>
             <a:endParaRPr lang="de-DE"/>
           </a:p>
@@ -863,7 +864,7 @@
           <a:p>
             <a:fld id="{FE9F7F82-BB56-45F9-B170-0F8CF6DB2CC7}" type="datetimeFigureOut">
               <a:rPr lang="de-DE" smtClean="0"/>
-              <a:t>27.11.2024</a:t>
+              <a:t>28.11.2024</a:t>
             </a:fld>
             <a:endParaRPr lang="de-DE"/>
           </a:p>
@@ -1138,7 +1139,7 @@
           <a:p>
             <a:fld id="{FE9F7F82-BB56-45F9-B170-0F8CF6DB2CC7}" type="datetimeFigureOut">
               <a:rPr lang="de-DE" smtClean="0"/>
-              <a:t>27.11.2024</a:t>
+              <a:t>28.11.2024</a:t>
             </a:fld>
             <a:endParaRPr lang="de-DE"/>
           </a:p>
@@ -1403,7 +1404,7 @@
           <a:p>
             <a:fld id="{FE9F7F82-BB56-45F9-B170-0F8CF6DB2CC7}" type="datetimeFigureOut">
               <a:rPr lang="de-DE" smtClean="0"/>
-              <a:t>27.11.2024</a:t>
+              <a:t>28.11.2024</a:t>
             </a:fld>
             <a:endParaRPr lang="de-DE"/>
           </a:p>
@@ -1815,7 +1816,7 @@
           <a:p>
             <a:fld id="{FE9F7F82-BB56-45F9-B170-0F8CF6DB2CC7}" type="datetimeFigureOut">
               <a:rPr lang="de-DE" smtClean="0"/>
-              <a:t>27.11.2024</a:t>
+              <a:t>28.11.2024</a:t>
             </a:fld>
             <a:endParaRPr lang="de-DE"/>
           </a:p>
@@ -1956,7 +1957,7 @@
           <a:p>
             <a:fld id="{FE9F7F82-BB56-45F9-B170-0F8CF6DB2CC7}" type="datetimeFigureOut">
               <a:rPr lang="de-DE" smtClean="0"/>
-              <a:t>27.11.2024</a:t>
+              <a:t>28.11.2024</a:t>
             </a:fld>
             <a:endParaRPr lang="de-DE"/>
           </a:p>
@@ -2069,7 +2070,7 @@
           <a:p>
             <a:fld id="{FE9F7F82-BB56-45F9-B170-0F8CF6DB2CC7}" type="datetimeFigureOut">
               <a:rPr lang="de-DE" smtClean="0"/>
-              <a:t>27.11.2024</a:t>
+              <a:t>28.11.2024</a:t>
             </a:fld>
             <a:endParaRPr lang="de-DE"/>
           </a:p>
@@ -2380,7 +2381,7 @@
           <a:p>
             <a:fld id="{FE9F7F82-BB56-45F9-B170-0F8CF6DB2CC7}" type="datetimeFigureOut">
               <a:rPr lang="de-DE" smtClean="0"/>
-              <a:t>27.11.2024</a:t>
+              <a:t>28.11.2024</a:t>
             </a:fld>
             <a:endParaRPr lang="de-DE"/>
           </a:p>
@@ -2668,7 +2669,7 @@
           <a:p>
             <a:fld id="{FE9F7F82-BB56-45F9-B170-0F8CF6DB2CC7}" type="datetimeFigureOut">
               <a:rPr lang="de-DE" smtClean="0"/>
-              <a:t>27.11.2024</a:t>
+              <a:t>28.11.2024</a:t>
             </a:fld>
             <a:endParaRPr lang="de-DE"/>
           </a:p>
@@ -2909,7 +2910,7 @@
           <a:p>
             <a:fld id="{FE9F7F82-BB56-45F9-B170-0F8CF6DB2CC7}" type="datetimeFigureOut">
               <a:rPr lang="de-DE" smtClean="0"/>
-              <a:t>27.11.2024</a:t>
+              <a:t>28.11.2024</a:t>
             </a:fld>
             <a:endParaRPr lang="de-DE"/>
           </a:p>
@@ -7135,6 +7136,3838 @@
 </p:sld>
 </file>
 
+<file path=ppt/slides/slide2.xml><?xml version="1.0" encoding="utf-8"?>
+<p:sld xmlns:a="http://schemas.openxmlformats.org/drawingml/2006/main" xmlns:r="http://schemas.openxmlformats.org/officeDocument/2006/relationships" xmlns:p="http://schemas.openxmlformats.org/presentationml/2006/main">
+  <p:cSld>
+    <p:spTree>
+      <p:nvGrpSpPr>
+        <p:cNvPr id="1" name=""/>
+        <p:cNvGrpSpPr/>
+        <p:nvPr/>
+      </p:nvGrpSpPr>
+      <p:grpSpPr>
+        <a:xfrm>
+          <a:off x="0" y="0"/>
+          <a:ext cx="0" cy="0"/>
+          <a:chOff x="0" y="0"/>
+          <a:chExt cx="0" cy="0"/>
+        </a:xfrm>
+      </p:grpSpPr>
+      <p:pic>
+        <p:nvPicPr>
+          <p:cNvPr id="3" name="Grafik 2">
+            <a:extLst>
+              <a:ext uri="{FF2B5EF4-FFF2-40B4-BE49-F238E27FC236}">
+                <a16:creationId xmlns:a16="http://schemas.microsoft.com/office/drawing/2014/main" id="{38DD64E6-81E6-2282-6743-5CB93EB92B7E}"/>
+              </a:ext>
+            </a:extLst>
+          </p:cNvPr>
+          <p:cNvPicPr>
+            <a:picLocks noChangeAspect="1"/>
+          </p:cNvPicPr>
+          <p:nvPr/>
+        </p:nvPicPr>
+        <p:blipFill>
+          <a:blip r:embed="rId2">
+            <a:extLst>
+              <a:ext uri="{96DAC541-7B7A-43D3-8B79-37D633B846F1}">
+                <asvg:svgBlip xmlns:asvg="http://schemas.microsoft.com/office/drawing/2016/SVG/main" r:embed="rId3"/>
+              </a:ext>
+            </a:extLst>
+          </a:blip>
+          <a:stretch>
+            <a:fillRect/>
+          </a:stretch>
+        </p:blipFill>
+        <p:spPr>
+          <a:xfrm rot="20414162">
+            <a:off x="2492465" y="-49347"/>
+            <a:ext cx="6934346" cy="6578737"/>
+          </a:xfrm>
+          <a:prstGeom prst="rect">
+            <a:avLst/>
+          </a:prstGeom>
+        </p:spPr>
+      </p:pic>
+      <p:sp>
+        <p:nvSpPr>
+          <p:cNvPr id="4" name="Ellipse 3">
+            <a:extLst>
+              <a:ext uri="{FF2B5EF4-FFF2-40B4-BE49-F238E27FC236}">
+                <a16:creationId xmlns:a16="http://schemas.microsoft.com/office/drawing/2014/main" id="{4B0B809D-719A-C6B7-863D-FF122E54DF3D}"/>
+              </a:ext>
+            </a:extLst>
+          </p:cNvPr>
+          <p:cNvSpPr/>
+          <p:nvPr/>
+        </p:nvSpPr>
+        <p:spPr>
+          <a:xfrm>
+            <a:off x="5973778" y="817439"/>
+            <a:ext cx="768859" cy="770753"/>
+          </a:xfrm>
+          <a:prstGeom prst="ellipse">
+            <a:avLst/>
+          </a:prstGeom>
+        </p:spPr>
+        <p:style>
+          <a:lnRef idx="2">
+            <a:schemeClr val="accent2">
+              <a:shade val="15000"/>
+            </a:schemeClr>
+          </a:lnRef>
+          <a:fillRef idx="1">
+            <a:schemeClr val="accent2"/>
+          </a:fillRef>
+          <a:effectRef idx="0">
+            <a:schemeClr val="accent2"/>
+          </a:effectRef>
+          <a:fontRef idx="minor">
+            <a:schemeClr val="lt1"/>
+          </a:fontRef>
+        </p:style>
+        <p:txBody>
+          <a:bodyPr rtlCol="0" anchor="ctr"/>
+          <a:lstStyle/>
+          <a:p>
+            <a:pPr algn="ctr"/>
+            <a:r>
+              <a:rPr lang="de-DE" sz="3000" b="1" dirty="0"/>
+              <a:t>0</a:t>
+            </a:r>
+          </a:p>
+        </p:txBody>
+      </p:sp>
+      <p:sp>
+        <p:nvSpPr>
+          <p:cNvPr id="5" name="Ellipse 4">
+            <a:extLst>
+              <a:ext uri="{FF2B5EF4-FFF2-40B4-BE49-F238E27FC236}">
+                <a16:creationId xmlns:a16="http://schemas.microsoft.com/office/drawing/2014/main" id="{045F4D3E-F2AC-4900-E575-DF71D434EA41}"/>
+              </a:ext>
+            </a:extLst>
+          </p:cNvPr>
+          <p:cNvSpPr/>
+          <p:nvPr/>
+        </p:nvSpPr>
+        <p:spPr>
+          <a:xfrm>
+            <a:off x="7543236" y="2205660"/>
+            <a:ext cx="768859" cy="770753"/>
+          </a:xfrm>
+          <a:prstGeom prst="ellipse">
+            <a:avLst/>
+          </a:prstGeom>
+        </p:spPr>
+        <p:style>
+          <a:lnRef idx="2">
+            <a:schemeClr val="accent2">
+              <a:shade val="15000"/>
+            </a:schemeClr>
+          </a:lnRef>
+          <a:fillRef idx="1">
+            <a:schemeClr val="accent2"/>
+          </a:fillRef>
+          <a:effectRef idx="0">
+            <a:schemeClr val="accent2"/>
+          </a:effectRef>
+          <a:fontRef idx="minor">
+            <a:schemeClr val="lt1"/>
+          </a:fontRef>
+        </p:style>
+        <p:txBody>
+          <a:bodyPr rtlCol="0" anchor="ctr"/>
+          <a:lstStyle/>
+          <a:p>
+            <a:pPr algn="ctr"/>
+            <a:r>
+              <a:rPr lang="de-DE" sz="3000" b="1" dirty="0"/>
+              <a:t>1</a:t>
+            </a:r>
+          </a:p>
+        </p:txBody>
+      </p:sp>
+      <p:sp>
+        <p:nvSpPr>
+          <p:cNvPr id="6" name="Ellipse 5">
+            <a:extLst>
+              <a:ext uri="{FF2B5EF4-FFF2-40B4-BE49-F238E27FC236}">
+                <a16:creationId xmlns:a16="http://schemas.microsoft.com/office/drawing/2014/main" id="{A50F142B-15EF-573C-D99B-D315A7D1B47B}"/>
+              </a:ext>
+            </a:extLst>
+          </p:cNvPr>
+          <p:cNvSpPr/>
+          <p:nvPr/>
+        </p:nvSpPr>
+        <p:spPr>
+          <a:xfrm>
+            <a:off x="7120156" y="4232311"/>
+            <a:ext cx="768859" cy="770753"/>
+          </a:xfrm>
+          <a:prstGeom prst="ellipse">
+            <a:avLst/>
+          </a:prstGeom>
+        </p:spPr>
+        <p:style>
+          <a:lnRef idx="2">
+            <a:schemeClr val="accent2">
+              <a:shade val="15000"/>
+            </a:schemeClr>
+          </a:lnRef>
+          <a:fillRef idx="1">
+            <a:schemeClr val="accent2"/>
+          </a:fillRef>
+          <a:effectRef idx="0">
+            <a:schemeClr val="accent2"/>
+          </a:effectRef>
+          <a:fontRef idx="minor">
+            <a:schemeClr val="lt1"/>
+          </a:fontRef>
+        </p:style>
+        <p:txBody>
+          <a:bodyPr rtlCol="0" anchor="ctr"/>
+          <a:lstStyle/>
+          <a:p>
+            <a:pPr algn="ctr"/>
+            <a:r>
+              <a:rPr lang="de-DE" sz="3000" b="1" dirty="0"/>
+              <a:t>2</a:t>
+            </a:r>
+          </a:p>
+        </p:txBody>
+      </p:sp>
+      <p:sp>
+        <p:nvSpPr>
+          <p:cNvPr id="7" name="Ellipse 6">
+            <a:extLst>
+              <a:ext uri="{FF2B5EF4-FFF2-40B4-BE49-F238E27FC236}">
+                <a16:creationId xmlns:a16="http://schemas.microsoft.com/office/drawing/2014/main" id="{56A661A9-EB51-E417-6D8F-D43C7CC04318}"/>
+              </a:ext>
+            </a:extLst>
+          </p:cNvPr>
+          <p:cNvSpPr/>
+          <p:nvPr/>
+        </p:nvSpPr>
+        <p:spPr>
+          <a:xfrm>
+            <a:off x="5162720" y="4865918"/>
+            <a:ext cx="768859" cy="770753"/>
+          </a:xfrm>
+          <a:prstGeom prst="ellipse">
+            <a:avLst/>
+          </a:prstGeom>
+        </p:spPr>
+        <p:style>
+          <a:lnRef idx="2">
+            <a:schemeClr val="accent2">
+              <a:shade val="15000"/>
+            </a:schemeClr>
+          </a:lnRef>
+          <a:fillRef idx="1">
+            <a:schemeClr val="accent2"/>
+          </a:fillRef>
+          <a:effectRef idx="0">
+            <a:schemeClr val="accent2"/>
+          </a:effectRef>
+          <a:fontRef idx="minor">
+            <a:schemeClr val="lt1"/>
+          </a:fontRef>
+        </p:style>
+        <p:txBody>
+          <a:bodyPr rtlCol="0" anchor="ctr"/>
+          <a:lstStyle/>
+          <a:p>
+            <a:pPr algn="ctr"/>
+            <a:r>
+              <a:rPr lang="de-DE" sz="3000" b="1" dirty="0"/>
+              <a:t>3</a:t>
+            </a:r>
+          </a:p>
+        </p:txBody>
+      </p:sp>
+      <p:sp>
+        <p:nvSpPr>
+          <p:cNvPr id="8" name="Ellipse 7">
+            <a:extLst>
+              <a:ext uri="{FF2B5EF4-FFF2-40B4-BE49-F238E27FC236}">
+                <a16:creationId xmlns:a16="http://schemas.microsoft.com/office/drawing/2014/main" id="{A00ABC3D-C8B8-05CE-674A-D73EE129B430}"/>
+              </a:ext>
+            </a:extLst>
+          </p:cNvPr>
+          <p:cNvSpPr/>
+          <p:nvPr/>
+        </p:nvSpPr>
+        <p:spPr>
+          <a:xfrm>
+            <a:off x="3646738" y="3479668"/>
+            <a:ext cx="768859" cy="770753"/>
+          </a:xfrm>
+          <a:prstGeom prst="ellipse">
+            <a:avLst/>
+          </a:prstGeom>
+        </p:spPr>
+        <p:style>
+          <a:lnRef idx="2">
+            <a:schemeClr val="accent2">
+              <a:shade val="15000"/>
+            </a:schemeClr>
+          </a:lnRef>
+          <a:fillRef idx="1">
+            <a:schemeClr val="accent2"/>
+          </a:fillRef>
+          <a:effectRef idx="0">
+            <a:schemeClr val="accent2"/>
+          </a:effectRef>
+          <a:fontRef idx="minor">
+            <a:schemeClr val="lt1"/>
+          </a:fontRef>
+        </p:style>
+        <p:txBody>
+          <a:bodyPr rtlCol="0" anchor="ctr"/>
+          <a:lstStyle/>
+          <a:p>
+            <a:pPr algn="ctr"/>
+            <a:r>
+              <a:rPr lang="de-DE" sz="3000" b="1" dirty="0"/>
+              <a:t>4</a:t>
+            </a:r>
+          </a:p>
+        </p:txBody>
+      </p:sp>
+      <p:sp>
+        <p:nvSpPr>
+          <p:cNvPr id="9" name="Ellipse 8">
+            <a:extLst>
+              <a:ext uri="{FF2B5EF4-FFF2-40B4-BE49-F238E27FC236}">
+                <a16:creationId xmlns:a16="http://schemas.microsoft.com/office/drawing/2014/main" id="{B51C7367-92D9-F9A1-72E6-5182E646A33E}"/>
+              </a:ext>
+            </a:extLst>
+          </p:cNvPr>
+          <p:cNvSpPr/>
+          <p:nvPr/>
+        </p:nvSpPr>
+        <p:spPr>
+          <a:xfrm>
+            <a:off x="4043736" y="1502785"/>
+            <a:ext cx="768859" cy="770753"/>
+          </a:xfrm>
+          <a:prstGeom prst="ellipse">
+            <a:avLst/>
+          </a:prstGeom>
+        </p:spPr>
+        <p:style>
+          <a:lnRef idx="2">
+            <a:schemeClr val="accent2">
+              <a:shade val="15000"/>
+            </a:schemeClr>
+          </a:lnRef>
+          <a:fillRef idx="1">
+            <a:schemeClr val="accent2"/>
+          </a:fillRef>
+          <a:effectRef idx="0">
+            <a:schemeClr val="accent2"/>
+          </a:effectRef>
+          <a:fontRef idx="minor">
+            <a:schemeClr val="lt1"/>
+          </a:fontRef>
+        </p:style>
+        <p:txBody>
+          <a:bodyPr rtlCol="0" anchor="ctr"/>
+          <a:lstStyle/>
+          <a:p>
+            <a:pPr algn="ctr"/>
+            <a:r>
+              <a:rPr lang="de-DE" sz="3000" b="1" dirty="0"/>
+              <a:t>5</a:t>
+            </a:r>
+          </a:p>
+        </p:txBody>
+      </p:sp>
+      <p:sp>
+        <p:nvSpPr>
+          <p:cNvPr id="10" name="Ellipse 9">
+            <a:extLst>
+              <a:ext uri="{FF2B5EF4-FFF2-40B4-BE49-F238E27FC236}">
+                <a16:creationId xmlns:a16="http://schemas.microsoft.com/office/drawing/2014/main" id="{8594322F-8205-ACE4-4E76-3CA255BDA4A9}"/>
+              </a:ext>
+            </a:extLst>
+          </p:cNvPr>
+          <p:cNvSpPr/>
+          <p:nvPr/>
+        </p:nvSpPr>
+        <p:spPr>
+          <a:xfrm>
+            <a:off x="5667466" y="3033256"/>
+            <a:ext cx="768859" cy="770753"/>
+          </a:xfrm>
+          <a:prstGeom prst="ellipse">
+            <a:avLst/>
+          </a:prstGeom>
+        </p:spPr>
+        <p:style>
+          <a:lnRef idx="2">
+            <a:schemeClr val="accent2">
+              <a:shade val="15000"/>
+            </a:schemeClr>
+          </a:lnRef>
+          <a:fillRef idx="1">
+            <a:schemeClr val="accent2"/>
+          </a:fillRef>
+          <a:effectRef idx="0">
+            <a:schemeClr val="accent2"/>
+          </a:effectRef>
+          <a:fontRef idx="minor">
+            <a:schemeClr val="lt1"/>
+          </a:fontRef>
+        </p:style>
+        <p:txBody>
+          <a:bodyPr rtlCol="0" anchor="ctr"/>
+          <a:lstStyle/>
+          <a:p>
+            <a:pPr algn="ctr"/>
+            <a:r>
+              <a:rPr lang="de-DE" sz="3000" b="1" dirty="0"/>
+              <a:t>#</a:t>
+            </a:r>
+          </a:p>
+        </p:txBody>
+      </p:sp>
+      <p:grpSp>
+        <p:nvGrpSpPr>
+          <p:cNvPr id="11" name="Gruppieren 10">
+            <a:extLst>
+              <a:ext uri="{FF2B5EF4-FFF2-40B4-BE49-F238E27FC236}">
+                <a16:creationId xmlns:a16="http://schemas.microsoft.com/office/drawing/2014/main" id="{C8F7044D-0961-E7C7-CF57-61818CBEB13C}"/>
+              </a:ext>
+            </a:extLst>
+          </p:cNvPr>
+          <p:cNvGrpSpPr/>
+          <p:nvPr/>
+        </p:nvGrpSpPr>
+        <p:grpSpPr>
+          <a:xfrm>
+            <a:off x="4948171" y="2177058"/>
+            <a:ext cx="1972860" cy="2200900"/>
+            <a:chOff x="5040838" y="2320183"/>
+            <a:chExt cx="1972860" cy="2200900"/>
+          </a:xfrm>
+        </p:grpSpPr>
+        <p:sp>
+          <p:nvSpPr>
+            <p:cNvPr id="12" name="Textfeld 11">
+              <a:extLst>
+                <a:ext uri="{FF2B5EF4-FFF2-40B4-BE49-F238E27FC236}">
+                  <a16:creationId xmlns:a16="http://schemas.microsoft.com/office/drawing/2014/main" id="{C6D10FDC-B0CB-AFE2-3DD9-0EFF01D96933}"/>
+                </a:ext>
+              </a:extLst>
+            </p:cNvPr>
+            <p:cNvSpPr txBox="1"/>
+            <p:nvPr/>
+          </p:nvSpPr>
+          <p:spPr>
+            <a:xfrm>
+              <a:off x="5905144" y="2320183"/>
+              <a:ext cx="308098" cy="369332"/>
+            </a:xfrm>
+            <a:prstGeom prst="rect">
+              <a:avLst/>
+            </a:prstGeom>
+            <a:noFill/>
+          </p:spPr>
+          <p:txBody>
+            <a:bodyPr wrap="none" rtlCol="0">
+              <a:spAutoFit/>
+            </a:bodyPr>
+            <a:lstStyle/>
+            <a:p>
+              <a:r>
+                <a:rPr lang="de-DE" b="1" dirty="0">
+                  <a:solidFill>
+                    <a:srgbClr val="FF0000"/>
+                  </a:solidFill>
+                </a:rPr>
+                <a:t>0</a:t>
+              </a:r>
+            </a:p>
+          </p:txBody>
+        </p:sp>
+        <p:sp>
+          <p:nvSpPr>
+            <p:cNvPr id="13" name="Textfeld 12">
+              <a:extLst>
+                <a:ext uri="{FF2B5EF4-FFF2-40B4-BE49-F238E27FC236}">
+                  <a16:creationId xmlns:a16="http://schemas.microsoft.com/office/drawing/2014/main" id="{8DDCF576-0B14-5680-AB11-6EF8ABCCA453}"/>
+                </a:ext>
+              </a:extLst>
+            </p:cNvPr>
+            <p:cNvSpPr txBox="1"/>
+            <p:nvPr/>
+          </p:nvSpPr>
+          <p:spPr>
+            <a:xfrm>
+              <a:off x="6305372" y="2549496"/>
+              <a:ext cx="308098" cy="369332"/>
+            </a:xfrm>
+            <a:prstGeom prst="rect">
+              <a:avLst/>
+            </a:prstGeom>
+            <a:noFill/>
+          </p:spPr>
+          <p:txBody>
+            <a:bodyPr wrap="none" rtlCol="0">
+              <a:spAutoFit/>
+            </a:bodyPr>
+            <a:lstStyle/>
+            <a:p>
+              <a:r>
+                <a:rPr lang="de-DE" b="1" dirty="0">
+                  <a:solidFill>
+                    <a:srgbClr val="FF0000"/>
+                  </a:solidFill>
+                </a:rPr>
+                <a:t>1</a:t>
+              </a:r>
+            </a:p>
+          </p:txBody>
+        </p:sp>
+        <p:sp>
+          <p:nvSpPr>
+            <p:cNvPr id="14" name="Textfeld 13">
+              <a:extLst>
+                <a:ext uri="{FF2B5EF4-FFF2-40B4-BE49-F238E27FC236}">
+                  <a16:creationId xmlns:a16="http://schemas.microsoft.com/office/drawing/2014/main" id="{1DC30315-2F19-ABF3-AC09-F86B6F78499E}"/>
+                </a:ext>
+              </a:extLst>
+            </p:cNvPr>
+            <p:cNvSpPr txBox="1"/>
+            <p:nvPr/>
+          </p:nvSpPr>
+          <p:spPr>
+            <a:xfrm>
+              <a:off x="6705600" y="2768346"/>
+              <a:ext cx="308098" cy="369332"/>
+            </a:xfrm>
+            <a:prstGeom prst="rect">
+              <a:avLst/>
+            </a:prstGeom>
+            <a:noFill/>
+          </p:spPr>
+          <p:txBody>
+            <a:bodyPr wrap="none" rtlCol="0">
+              <a:spAutoFit/>
+            </a:bodyPr>
+            <a:lstStyle/>
+            <a:p>
+              <a:r>
+                <a:rPr lang="de-DE" b="1" dirty="0">
+                  <a:solidFill>
+                    <a:srgbClr val="FF0000"/>
+                  </a:solidFill>
+                </a:rPr>
+                <a:t>2</a:t>
+              </a:r>
+            </a:p>
+          </p:txBody>
+        </p:sp>
+        <p:sp>
+          <p:nvSpPr>
+            <p:cNvPr id="15" name="Textfeld 14">
+              <a:extLst>
+                <a:ext uri="{FF2B5EF4-FFF2-40B4-BE49-F238E27FC236}">
+                  <a16:creationId xmlns:a16="http://schemas.microsoft.com/office/drawing/2014/main" id="{9BD197C8-C62E-CC02-7A06-ACF822FA3E76}"/>
+                </a:ext>
+              </a:extLst>
+            </p:cNvPr>
+            <p:cNvSpPr txBox="1"/>
+            <p:nvPr/>
+          </p:nvSpPr>
+          <p:spPr>
+            <a:xfrm>
+              <a:off x="6704175" y="3222968"/>
+              <a:ext cx="308098" cy="369332"/>
+            </a:xfrm>
+            <a:prstGeom prst="rect">
+              <a:avLst/>
+            </a:prstGeom>
+            <a:noFill/>
+          </p:spPr>
+          <p:txBody>
+            <a:bodyPr wrap="none" rtlCol="0">
+              <a:spAutoFit/>
+            </a:bodyPr>
+            <a:lstStyle/>
+            <a:p>
+              <a:r>
+                <a:rPr lang="de-DE" b="1" dirty="0">
+                  <a:solidFill>
+                    <a:srgbClr val="FF0000"/>
+                  </a:solidFill>
+                </a:rPr>
+                <a:t>3</a:t>
+              </a:r>
+            </a:p>
+          </p:txBody>
+        </p:sp>
+        <p:sp>
+          <p:nvSpPr>
+            <p:cNvPr id="16" name="Textfeld 15">
+              <a:extLst>
+                <a:ext uri="{FF2B5EF4-FFF2-40B4-BE49-F238E27FC236}">
+                  <a16:creationId xmlns:a16="http://schemas.microsoft.com/office/drawing/2014/main" id="{A9ECF900-3DB4-1252-EA6C-FB00C94216CC}"/>
+                </a:ext>
+              </a:extLst>
+            </p:cNvPr>
+            <p:cNvSpPr txBox="1"/>
+            <p:nvPr/>
+          </p:nvSpPr>
+          <p:spPr>
+            <a:xfrm>
+              <a:off x="6704175" y="3677590"/>
+              <a:ext cx="308098" cy="369332"/>
+            </a:xfrm>
+            <a:prstGeom prst="rect">
+              <a:avLst/>
+            </a:prstGeom>
+            <a:noFill/>
+          </p:spPr>
+          <p:txBody>
+            <a:bodyPr wrap="none" rtlCol="0">
+              <a:spAutoFit/>
+            </a:bodyPr>
+            <a:lstStyle/>
+            <a:p>
+              <a:r>
+                <a:rPr lang="de-DE" b="1" dirty="0">
+                  <a:solidFill>
+                    <a:srgbClr val="FF0000"/>
+                  </a:solidFill>
+                </a:rPr>
+                <a:t>4</a:t>
+              </a:r>
+            </a:p>
+          </p:txBody>
+        </p:sp>
+        <p:sp>
+          <p:nvSpPr>
+            <p:cNvPr id="17" name="Textfeld 16">
+              <a:extLst>
+                <a:ext uri="{FF2B5EF4-FFF2-40B4-BE49-F238E27FC236}">
+                  <a16:creationId xmlns:a16="http://schemas.microsoft.com/office/drawing/2014/main" id="{8D4FD2B1-4039-B2C5-9EB4-34B0D6A9FBD7}"/>
+                </a:ext>
+              </a:extLst>
+            </p:cNvPr>
+            <p:cNvSpPr txBox="1"/>
+            <p:nvPr/>
+          </p:nvSpPr>
+          <p:spPr>
+            <a:xfrm>
+              <a:off x="6296826" y="3904986"/>
+              <a:ext cx="308098" cy="369332"/>
+            </a:xfrm>
+            <a:prstGeom prst="rect">
+              <a:avLst/>
+            </a:prstGeom>
+            <a:noFill/>
+          </p:spPr>
+          <p:txBody>
+            <a:bodyPr wrap="none" rtlCol="0">
+              <a:spAutoFit/>
+            </a:bodyPr>
+            <a:lstStyle/>
+            <a:p>
+              <a:r>
+                <a:rPr lang="de-DE" b="1" dirty="0">
+                  <a:solidFill>
+                    <a:srgbClr val="FF0000"/>
+                  </a:solidFill>
+                </a:rPr>
+                <a:t>5</a:t>
+              </a:r>
+            </a:p>
+          </p:txBody>
+        </p:sp>
+        <p:sp>
+          <p:nvSpPr>
+            <p:cNvPr id="18" name="Textfeld 17">
+              <a:extLst>
+                <a:ext uri="{FF2B5EF4-FFF2-40B4-BE49-F238E27FC236}">
+                  <a16:creationId xmlns:a16="http://schemas.microsoft.com/office/drawing/2014/main" id="{285225F9-3D67-1B05-38B0-ECF27EE0431A}"/>
+                </a:ext>
+              </a:extLst>
+            </p:cNvPr>
+            <p:cNvSpPr txBox="1"/>
+            <p:nvPr/>
+          </p:nvSpPr>
+          <p:spPr>
+            <a:xfrm>
+              <a:off x="5905144" y="4151751"/>
+              <a:ext cx="308098" cy="369332"/>
+            </a:xfrm>
+            <a:prstGeom prst="rect">
+              <a:avLst/>
+            </a:prstGeom>
+            <a:noFill/>
+          </p:spPr>
+          <p:txBody>
+            <a:bodyPr wrap="none" rtlCol="0">
+              <a:spAutoFit/>
+            </a:bodyPr>
+            <a:lstStyle/>
+            <a:p>
+              <a:r>
+                <a:rPr lang="de-DE" b="1" dirty="0">
+                  <a:solidFill>
+                    <a:srgbClr val="FF0000"/>
+                  </a:solidFill>
+                </a:rPr>
+                <a:t>6</a:t>
+              </a:r>
+            </a:p>
+          </p:txBody>
+        </p:sp>
+        <p:sp>
+          <p:nvSpPr>
+            <p:cNvPr id="19" name="Textfeld 18">
+              <a:extLst>
+                <a:ext uri="{FF2B5EF4-FFF2-40B4-BE49-F238E27FC236}">
+                  <a16:creationId xmlns:a16="http://schemas.microsoft.com/office/drawing/2014/main" id="{338E7F92-52F1-F060-E8E2-746B58952228}"/>
+                </a:ext>
+              </a:extLst>
+            </p:cNvPr>
+            <p:cNvSpPr txBox="1"/>
+            <p:nvPr/>
+          </p:nvSpPr>
+          <p:spPr>
+            <a:xfrm>
+              <a:off x="5500644" y="3909259"/>
+              <a:ext cx="308098" cy="369332"/>
+            </a:xfrm>
+            <a:prstGeom prst="rect">
+              <a:avLst/>
+            </a:prstGeom>
+            <a:noFill/>
+          </p:spPr>
+          <p:txBody>
+            <a:bodyPr wrap="none" rtlCol="0">
+              <a:spAutoFit/>
+            </a:bodyPr>
+            <a:lstStyle/>
+            <a:p>
+              <a:r>
+                <a:rPr lang="de-DE" b="1" dirty="0">
+                  <a:solidFill>
+                    <a:srgbClr val="FF0000"/>
+                  </a:solidFill>
+                </a:rPr>
+                <a:t>7</a:t>
+              </a:r>
+            </a:p>
+          </p:txBody>
+        </p:sp>
+        <p:sp>
+          <p:nvSpPr>
+            <p:cNvPr id="20" name="Textfeld 19">
+              <a:extLst>
+                <a:ext uri="{FF2B5EF4-FFF2-40B4-BE49-F238E27FC236}">
+                  <a16:creationId xmlns:a16="http://schemas.microsoft.com/office/drawing/2014/main" id="{D57B13F4-B5B4-4D41-3054-5D10D48CA7FD}"/>
+                </a:ext>
+              </a:extLst>
+            </p:cNvPr>
+            <p:cNvSpPr txBox="1"/>
+            <p:nvPr/>
+          </p:nvSpPr>
+          <p:spPr>
+            <a:xfrm>
+              <a:off x="5102553" y="3677590"/>
+              <a:ext cx="308098" cy="369332"/>
+            </a:xfrm>
+            <a:prstGeom prst="rect">
+              <a:avLst/>
+            </a:prstGeom>
+            <a:noFill/>
+          </p:spPr>
+          <p:txBody>
+            <a:bodyPr wrap="none" rtlCol="0">
+              <a:spAutoFit/>
+            </a:bodyPr>
+            <a:lstStyle/>
+            <a:p>
+              <a:r>
+                <a:rPr lang="de-DE" b="1" dirty="0">
+                  <a:solidFill>
+                    <a:srgbClr val="FF0000"/>
+                  </a:solidFill>
+                </a:rPr>
+                <a:t>8</a:t>
+              </a:r>
+            </a:p>
+          </p:txBody>
+        </p:sp>
+        <p:sp>
+          <p:nvSpPr>
+            <p:cNvPr id="21" name="Textfeld 20">
+              <a:extLst>
+                <a:ext uri="{FF2B5EF4-FFF2-40B4-BE49-F238E27FC236}">
+                  <a16:creationId xmlns:a16="http://schemas.microsoft.com/office/drawing/2014/main" id="{858236D7-B7BA-38D4-8EF1-C6E7D7F3A387}"/>
+                </a:ext>
+              </a:extLst>
+            </p:cNvPr>
+            <p:cNvSpPr txBox="1"/>
+            <p:nvPr/>
+          </p:nvSpPr>
+          <p:spPr>
+            <a:xfrm>
+              <a:off x="5040838" y="2768346"/>
+              <a:ext cx="431528" cy="369332"/>
+            </a:xfrm>
+            <a:prstGeom prst="rect">
+              <a:avLst/>
+            </a:prstGeom>
+            <a:noFill/>
+          </p:spPr>
+          <p:txBody>
+            <a:bodyPr wrap="none" rtlCol="0">
+              <a:spAutoFit/>
+            </a:bodyPr>
+            <a:lstStyle/>
+            <a:p>
+              <a:r>
+                <a:rPr lang="de-DE" b="1" dirty="0">
+                  <a:solidFill>
+                    <a:srgbClr val="FF0000"/>
+                  </a:solidFill>
+                </a:rPr>
+                <a:t>10</a:t>
+              </a:r>
+            </a:p>
+          </p:txBody>
+        </p:sp>
+        <p:sp>
+          <p:nvSpPr>
+            <p:cNvPr id="22" name="Textfeld 21">
+              <a:extLst>
+                <a:ext uri="{FF2B5EF4-FFF2-40B4-BE49-F238E27FC236}">
+                  <a16:creationId xmlns:a16="http://schemas.microsoft.com/office/drawing/2014/main" id="{D34E33EA-70BB-A530-C92C-F93F9E58BFEE}"/>
+                </a:ext>
+              </a:extLst>
+            </p:cNvPr>
+            <p:cNvSpPr txBox="1"/>
+            <p:nvPr/>
+          </p:nvSpPr>
+          <p:spPr>
+            <a:xfrm>
+              <a:off x="5438929" y="2549496"/>
+              <a:ext cx="431528" cy="369332"/>
+            </a:xfrm>
+            <a:prstGeom prst="rect">
+              <a:avLst/>
+            </a:prstGeom>
+            <a:noFill/>
+          </p:spPr>
+          <p:txBody>
+            <a:bodyPr wrap="none" rtlCol="0">
+              <a:spAutoFit/>
+            </a:bodyPr>
+            <a:lstStyle/>
+            <a:p>
+              <a:r>
+                <a:rPr lang="de-DE" b="1" dirty="0">
+                  <a:solidFill>
+                    <a:srgbClr val="FF0000"/>
+                  </a:solidFill>
+                </a:rPr>
+                <a:t>11</a:t>
+              </a:r>
+            </a:p>
+          </p:txBody>
+        </p:sp>
+        <p:sp>
+          <p:nvSpPr>
+            <p:cNvPr id="23" name="Textfeld 22">
+              <a:extLst>
+                <a:ext uri="{FF2B5EF4-FFF2-40B4-BE49-F238E27FC236}">
+                  <a16:creationId xmlns:a16="http://schemas.microsoft.com/office/drawing/2014/main" id="{5B5222F4-A8EC-EAD3-CF67-957315653749}"/>
+                </a:ext>
+              </a:extLst>
+            </p:cNvPr>
+            <p:cNvSpPr txBox="1"/>
+            <p:nvPr/>
+          </p:nvSpPr>
+          <p:spPr>
+            <a:xfrm>
+              <a:off x="5101338" y="3222968"/>
+              <a:ext cx="308098" cy="369332"/>
+            </a:xfrm>
+            <a:prstGeom prst="rect">
+              <a:avLst/>
+            </a:prstGeom>
+            <a:noFill/>
+          </p:spPr>
+          <p:txBody>
+            <a:bodyPr wrap="none" rtlCol="0">
+              <a:spAutoFit/>
+            </a:bodyPr>
+            <a:lstStyle/>
+            <a:p>
+              <a:r>
+                <a:rPr lang="de-DE" b="1" dirty="0">
+                  <a:solidFill>
+                    <a:srgbClr val="FF0000"/>
+                  </a:solidFill>
+                </a:rPr>
+                <a:t>9</a:t>
+              </a:r>
+            </a:p>
+          </p:txBody>
+        </p:sp>
+      </p:grpSp>
+      <p:grpSp>
+        <p:nvGrpSpPr>
+          <p:cNvPr id="24" name="Gruppieren 23">
+            <a:extLst>
+              <a:ext uri="{FF2B5EF4-FFF2-40B4-BE49-F238E27FC236}">
+                <a16:creationId xmlns:a16="http://schemas.microsoft.com/office/drawing/2014/main" id="{07EF80E1-C2FF-969C-B72F-C212CD23C2CA}"/>
+              </a:ext>
+            </a:extLst>
+          </p:cNvPr>
+          <p:cNvGrpSpPr/>
+          <p:nvPr/>
+        </p:nvGrpSpPr>
+        <p:grpSpPr>
+          <a:xfrm>
+            <a:off x="3419967" y="848989"/>
+            <a:ext cx="1972860" cy="2200900"/>
+            <a:chOff x="5040838" y="2320183"/>
+            <a:chExt cx="1972860" cy="2200900"/>
+          </a:xfrm>
+        </p:grpSpPr>
+        <p:sp>
+          <p:nvSpPr>
+            <p:cNvPr id="25" name="Textfeld 24">
+              <a:extLst>
+                <a:ext uri="{FF2B5EF4-FFF2-40B4-BE49-F238E27FC236}">
+                  <a16:creationId xmlns:a16="http://schemas.microsoft.com/office/drawing/2014/main" id="{6864891D-C43D-A84A-96F5-36FE86DAB7CF}"/>
+                </a:ext>
+              </a:extLst>
+            </p:cNvPr>
+            <p:cNvSpPr txBox="1"/>
+            <p:nvPr/>
+          </p:nvSpPr>
+          <p:spPr>
+            <a:xfrm>
+              <a:off x="5905144" y="2320183"/>
+              <a:ext cx="308098" cy="369332"/>
+            </a:xfrm>
+            <a:prstGeom prst="rect">
+              <a:avLst/>
+            </a:prstGeom>
+            <a:noFill/>
+          </p:spPr>
+          <p:txBody>
+            <a:bodyPr wrap="none" rtlCol="0">
+              <a:spAutoFit/>
+            </a:bodyPr>
+            <a:lstStyle/>
+            <a:p>
+              <a:r>
+                <a:rPr lang="de-DE" b="1" dirty="0">
+                  <a:solidFill>
+                    <a:srgbClr val="FF0000"/>
+                  </a:solidFill>
+                </a:rPr>
+                <a:t>0</a:t>
+              </a:r>
+            </a:p>
+          </p:txBody>
+        </p:sp>
+        <p:sp>
+          <p:nvSpPr>
+            <p:cNvPr id="26" name="Textfeld 25">
+              <a:extLst>
+                <a:ext uri="{FF2B5EF4-FFF2-40B4-BE49-F238E27FC236}">
+                  <a16:creationId xmlns:a16="http://schemas.microsoft.com/office/drawing/2014/main" id="{5CEF0B17-F16C-4151-E850-EFCED3C7F715}"/>
+                </a:ext>
+              </a:extLst>
+            </p:cNvPr>
+            <p:cNvSpPr txBox="1"/>
+            <p:nvPr/>
+          </p:nvSpPr>
+          <p:spPr>
+            <a:xfrm>
+              <a:off x="6305372" y="2549496"/>
+              <a:ext cx="308098" cy="369332"/>
+            </a:xfrm>
+            <a:prstGeom prst="rect">
+              <a:avLst/>
+            </a:prstGeom>
+            <a:noFill/>
+          </p:spPr>
+          <p:txBody>
+            <a:bodyPr wrap="none" rtlCol="0">
+              <a:spAutoFit/>
+            </a:bodyPr>
+            <a:lstStyle/>
+            <a:p>
+              <a:r>
+                <a:rPr lang="de-DE" b="1" dirty="0">
+                  <a:solidFill>
+                    <a:srgbClr val="FF0000"/>
+                  </a:solidFill>
+                </a:rPr>
+                <a:t>1</a:t>
+              </a:r>
+            </a:p>
+          </p:txBody>
+        </p:sp>
+        <p:sp>
+          <p:nvSpPr>
+            <p:cNvPr id="27" name="Textfeld 26">
+              <a:extLst>
+                <a:ext uri="{FF2B5EF4-FFF2-40B4-BE49-F238E27FC236}">
+                  <a16:creationId xmlns:a16="http://schemas.microsoft.com/office/drawing/2014/main" id="{C6CFEB9A-28E8-6BA8-14BC-FE1450393A0A}"/>
+                </a:ext>
+              </a:extLst>
+            </p:cNvPr>
+            <p:cNvSpPr txBox="1"/>
+            <p:nvPr/>
+          </p:nvSpPr>
+          <p:spPr>
+            <a:xfrm>
+              <a:off x="6705600" y="2768346"/>
+              <a:ext cx="308098" cy="369332"/>
+            </a:xfrm>
+            <a:prstGeom prst="rect">
+              <a:avLst/>
+            </a:prstGeom>
+            <a:noFill/>
+          </p:spPr>
+          <p:txBody>
+            <a:bodyPr wrap="none" rtlCol="0">
+              <a:spAutoFit/>
+            </a:bodyPr>
+            <a:lstStyle/>
+            <a:p>
+              <a:r>
+                <a:rPr lang="de-DE" b="1" dirty="0">
+                  <a:solidFill>
+                    <a:srgbClr val="FF0000"/>
+                  </a:solidFill>
+                </a:rPr>
+                <a:t>2</a:t>
+              </a:r>
+            </a:p>
+          </p:txBody>
+        </p:sp>
+        <p:sp>
+          <p:nvSpPr>
+            <p:cNvPr id="28" name="Textfeld 27">
+              <a:extLst>
+                <a:ext uri="{FF2B5EF4-FFF2-40B4-BE49-F238E27FC236}">
+                  <a16:creationId xmlns:a16="http://schemas.microsoft.com/office/drawing/2014/main" id="{27EB37E2-8760-9F8F-C454-7956280C80EC}"/>
+                </a:ext>
+              </a:extLst>
+            </p:cNvPr>
+            <p:cNvSpPr txBox="1"/>
+            <p:nvPr/>
+          </p:nvSpPr>
+          <p:spPr>
+            <a:xfrm>
+              <a:off x="6704175" y="3222968"/>
+              <a:ext cx="308098" cy="369332"/>
+            </a:xfrm>
+            <a:prstGeom prst="rect">
+              <a:avLst/>
+            </a:prstGeom>
+            <a:noFill/>
+          </p:spPr>
+          <p:txBody>
+            <a:bodyPr wrap="none" rtlCol="0">
+              <a:spAutoFit/>
+            </a:bodyPr>
+            <a:lstStyle/>
+            <a:p>
+              <a:r>
+                <a:rPr lang="de-DE" b="1" dirty="0">
+                  <a:solidFill>
+                    <a:srgbClr val="FF0000"/>
+                  </a:solidFill>
+                </a:rPr>
+                <a:t>3</a:t>
+              </a:r>
+            </a:p>
+          </p:txBody>
+        </p:sp>
+        <p:sp>
+          <p:nvSpPr>
+            <p:cNvPr id="29" name="Textfeld 28">
+              <a:extLst>
+                <a:ext uri="{FF2B5EF4-FFF2-40B4-BE49-F238E27FC236}">
+                  <a16:creationId xmlns:a16="http://schemas.microsoft.com/office/drawing/2014/main" id="{CBCECBD0-E016-3E4C-8040-BF7A5C5666AE}"/>
+                </a:ext>
+              </a:extLst>
+            </p:cNvPr>
+            <p:cNvSpPr txBox="1"/>
+            <p:nvPr/>
+          </p:nvSpPr>
+          <p:spPr>
+            <a:xfrm>
+              <a:off x="6704175" y="3677590"/>
+              <a:ext cx="308098" cy="369332"/>
+            </a:xfrm>
+            <a:prstGeom prst="rect">
+              <a:avLst/>
+            </a:prstGeom>
+            <a:noFill/>
+          </p:spPr>
+          <p:txBody>
+            <a:bodyPr wrap="none" rtlCol="0">
+              <a:spAutoFit/>
+            </a:bodyPr>
+            <a:lstStyle/>
+            <a:p>
+              <a:r>
+                <a:rPr lang="de-DE" b="1" dirty="0">
+                  <a:solidFill>
+                    <a:srgbClr val="FF0000"/>
+                  </a:solidFill>
+                </a:rPr>
+                <a:t>4</a:t>
+              </a:r>
+            </a:p>
+          </p:txBody>
+        </p:sp>
+        <p:sp>
+          <p:nvSpPr>
+            <p:cNvPr id="30" name="Textfeld 29">
+              <a:extLst>
+                <a:ext uri="{FF2B5EF4-FFF2-40B4-BE49-F238E27FC236}">
+                  <a16:creationId xmlns:a16="http://schemas.microsoft.com/office/drawing/2014/main" id="{D374B8E6-B9D4-C758-EB07-B0165AB7AAC8}"/>
+                </a:ext>
+              </a:extLst>
+            </p:cNvPr>
+            <p:cNvSpPr txBox="1"/>
+            <p:nvPr/>
+          </p:nvSpPr>
+          <p:spPr>
+            <a:xfrm>
+              <a:off x="6296826" y="3904986"/>
+              <a:ext cx="308098" cy="369332"/>
+            </a:xfrm>
+            <a:prstGeom prst="rect">
+              <a:avLst/>
+            </a:prstGeom>
+            <a:noFill/>
+          </p:spPr>
+          <p:txBody>
+            <a:bodyPr wrap="none" rtlCol="0">
+              <a:spAutoFit/>
+            </a:bodyPr>
+            <a:lstStyle/>
+            <a:p>
+              <a:r>
+                <a:rPr lang="de-DE" b="1" dirty="0">
+                  <a:solidFill>
+                    <a:srgbClr val="FF0000"/>
+                  </a:solidFill>
+                </a:rPr>
+                <a:t>5</a:t>
+              </a:r>
+            </a:p>
+          </p:txBody>
+        </p:sp>
+        <p:sp>
+          <p:nvSpPr>
+            <p:cNvPr id="31" name="Textfeld 30">
+              <a:extLst>
+                <a:ext uri="{FF2B5EF4-FFF2-40B4-BE49-F238E27FC236}">
+                  <a16:creationId xmlns:a16="http://schemas.microsoft.com/office/drawing/2014/main" id="{AAE54B4C-A655-19E1-9A36-BE737FFCEA8C}"/>
+                </a:ext>
+              </a:extLst>
+            </p:cNvPr>
+            <p:cNvSpPr txBox="1"/>
+            <p:nvPr/>
+          </p:nvSpPr>
+          <p:spPr>
+            <a:xfrm>
+              <a:off x="5905144" y="4151751"/>
+              <a:ext cx="308098" cy="369332"/>
+            </a:xfrm>
+            <a:prstGeom prst="rect">
+              <a:avLst/>
+            </a:prstGeom>
+            <a:noFill/>
+          </p:spPr>
+          <p:txBody>
+            <a:bodyPr wrap="none" rtlCol="0">
+              <a:spAutoFit/>
+            </a:bodyPr>
+            <a:lstStyle/>
+            <a:p>
+              <a:r>
+                <a:rPr lang="de-DE" b="1" dirty="0">
+                  <a:solidFill>
+                    <a:srgbClr val="FF0000"/>
+                  </a:solidFill>
+                </a:rPr>
+                <a:t>6</a:t>
+              </a:r>
+            </a:p>
+          </p:txBody>
+        </p:sp>
+        <p:sp>
+          <p:nvSpPr>
+            <p:cNvPr id="32" name="Textfeld 31">
+              <a:extLst>
+                <a:ext uri="{FF2B5EF4-FFF2-40B4-BE49-F238E27FC236}">
+                  <a16:creationId xmlns:a16="http://schemas.microsoft.com/office/drawing/2014/main" id="{C8446907-7453-B410-BD64-A5CAC3C02776}"/>
+                </a:ext>
+              </a:extLst>
+            </p:cNvPr>
+            <p:cNvSpPr txBox="1"/>
+            <p:nvPr/>
+          </p:nvSpPr>
+          <p:spPr>
+            <a:xfrm>
+              <a:off x="5500644" y="3909259"/>
+              <a:ext cx="308098" cy="369332"/>
+            </a:xfrm>
+            <a:prstGeom prst="rect">
+              <a:avLst/>
+            </a:prstGeom>
+            <a:noFill/>
+          </p:spPr>
+          <p:txBody>
+            <a:bodyPr wrap="none" rtlCol="0">
+              <a:spAutoFit/>
+            </a:bodyPr>
+            <a:lstStyle/>
+            <a:p>
+              <a:r>
+                <a:rPr lang="de-DE" b="1" dirty="0">
+                  <a:solidFill>
+                    <a:srgbClr val="FF0000"/>
+                  </a:solidFill>
+                </a:rPr>
+                <a:t>7</a:t>
+              </a:r>
+            </a:p>
+          </p:txBody>
+        </p:sp>
+        <p:sp>
+          <p:nvSpPr>
+            <p:cNvPr id="33" name="Textfeld 32">
+              <a:extLst>
+                <a:ext uri="{FF2B5EF4-FFF2-40B4-BE49-F238E27FC236}">
+                  <a16:creationId xmlns:a16="http://schemas.microsoft.com/office/drawing/2014/main" id="{C759BF55-A7F6-8F02-C6CC-5FAF807AB176}"/>
+                </a:ext>
+              </a:extLst>
+            </p:cNvPr>
+            <p:cNvSpPr txBox="1"/>
+            <p:nvPr/>
+          </p:nvSpPr>
+          <p:spPr>
+            <a:xfrm>
+              <a:off x="5102553" y="3677590"/>
+              <a:ext cx="308098" cy="369332"/>
+            </a:xfrm>
+            <a:prstGeom prst="rect">
+              <a:avLst/>
+            </a:prstGeom>
+            <a:noFill/>
+          </p:spPr>
+          <p:txBody>
+            <a:bodyPr wrap="none" rtlCol="0">
+              <a:spAutoFit/>
+            </a:bodyPr>
+            <a:lstStyle/>
+            <a:p>
+              <a:r>
+                <a:rPr lang="de-DE" b="1" dirty="0">
+                  <a:solidFill>
+                    <a:srgbClr val="FF0000"/>
+                  </a:solidFill>
+                </a:rPr>
+                <a:t>8</a:t>
+              </a:r>
+            </a:p>
+          </p:txBody>
+        </p:sp>
+        <p:sp>
+          <p:nvSpPr>
+            <p:cNvPr id="34" name="Textfeld 33">
+              <a:extLst>
+                <a:ext uri="{FF2B5EF4-FFF2-40B4-BE49-F238E27FC236}">
+                  <a16:creationId xmlns:a16="http://schemas.microsoft.com/office/drawing/2014/main" id="{03240FE2-AA88-595C-E95A-BAD91E4C4F7D}"/>
+                </a:ext>
+              </a:extLst>
+            </p:cNvPr>
+            <p:cNvSpPr txBox="1"/>
+            <p:nvPr/>
+          </p:nvSpPr>
+          <p:spPr>
+            <a:xfrm>
+              <a:off x="5040838" y="2768346"/>
+              <a:ext cx="431528" cy="369332"/>
+            </a:xfrm>
+            <a:prstGeom prst="rect">
+              <a:avLst/>
+            </a:prstGeom>
+            <a:noFill/>
+          </p:spPr>
+          <p:txBody>
+            <a:bodyPr wrap="none" rtlCol="0">
+              <a:spAutoFit/>
+            </a:bodyPr>
+            <a:lstStyle/>
+            <a:p>
+              <a:r>
+                <a:rPr lang="de-DE" b="1" dirty="0">
+                  <a:solidFill>
+                    <a:srgbClr val="FF0000"/>
+                  </a:solidFill>
+                </a:rPr>
+                <a:t>10</a:t>
+              </a:r>
+            </a:p>
+          </p:txBody>
+        </p:sp>
+        <p:sp>
+          <p:nvSpPr>
+            <p:cNvPr id="35" name="Textfeld 34">
+              <a:extLst>
+                <a:ext uri="{FF2B5EF4-FFF2-40B4-BE49-F238E27FC236}">
+                  <a16:creationId xmlns:a16="http://schemas.microsoft.com/office/drawing/2014/main" id="{BC4B4413-0BC3-046B-19C5-1E08E091CB92}"/>
+                </a:ext>
+              </a:extLst>
+            </p:cNvPr>
+            <p:cNvSpPr txBox="1"/>
+            <p:nvPr/>
+          </p:nvSpPr>
+          <p:spPr>
+            <a:xfrm>
+              <a:off x="5438929" y="2549496"/>
+              <a:ext cx="431528" cy="369332"/>
+            </a:xfrm>
+            <a:prstGeom prst="rect">
+              <a:avLst/>
+            </a:prstGeom>
+            <a:noFill/>
+          </p:spPr>
+          <p:txBody>
+            <a:bodyPr wrap="none" rtlCol="0">
+              <a:spAutoFit/>
+            </a:bodyPr>
+            <a:lstStyle/>
+            <a:p>
+              <a:r>
+                <a:rPr lang="de-DE" b="1" dirty="0">
+                  <a:solidFill>
+                    <a:srgbClr val="FF0000"/>
+                  </a:solidFill>
+                </a:rPr>
+                <a:t>11</a:t>
+              </a:r>
+            </a:p>
+          </p:txBody>
+        </p:sp>
+        <p:sp>
+          <p:nvSpPr>
+            <p:cNvPr id="36" name="Textfeld 35">
+              <a:extLst>
+                <a:ext uri="{FF2B5EF4-FFF2-40B4-BE49-F238E27FC236}">
+                  <a16:creationId xmlns:a16="http://schemas.microsoft.com/office/drawing/2014/main" id="{E98E4299-FD77-806C-70AB-85D0082BA7BE}"/>
+                </a:ext>
+              </a:extLst>
+            </p:cNvPr>
+            <p:cNvSpPr txBox="1"/>
+            <p:nvPr/>
+          </p:nvSpPr>
+          <p:spPr>
+            <a:xfrm>
+              <a:off x="5101338" y="3222968"/>
+              <a:ext cx="308098" cy="369332"/>
+            </a:xfrm>
+            <a:prstGeom prst="rect">
+              <a:avLst/>
+            </a:prstGeom>
+            <a:noFill/>
+          </p:spPr>
+          <p:txBody>
+            <a:bodyPr wrap="none" rtlCol="0">
+              <a:spAutoFit/>
+            </a:bodyPr>
+            <a:lstStyle/>
+            <a:p>
+              <a:r>
+                <a:rPr lang="de-DE" b="1" dirty="0">
+                  <a:solidFill>
+                    <a:srgbClr val="FF0000"/>
+                  </a:solidFill>
+                </a:rPr>
+                <a:t>9</a:t>
+              </a:r>
+            </a:p>
+          </p:txBody>
+        </p:sp>
+      </p:grpSp>
+      <p:grpSp>
+        <p:nvGrpSpPr>
+          <p:cNvPr id="37" name="Gruppieren 36">
+            <a:extLst>
+              <a:ext uri="{FF2B5EF4-FFF2-40B4-BE49-F238E27FC236}">
+                <a16:creationId xmlns:a16="http://schemas.microsoft.com/office/drawing/2014/main" id="{8CB999DF-4C05-A5D8-4F69-AFB9368A4FE6}"/>
+              </a:ext>
+            </a:extLst>
+          </p:cNvPr>
+          <p:cNvGrpSpPr/>
+          <p:nvPr/>
+        </p:nvGrpSpPr>
+        <p:grpSpPr>
+          <a:xfrm>
+            <a:off x="3014344" y="2831219"/>
+            <a:ext cx="1972860" cy="2200900"/>
+            <a:chOff x="5040838" y="2320183"/>
+            <a:chExt cx="1972860" cy="2200900"/>
+          </a:xfrm>
+        </p:grpSpPr>
+        <p:sp>
+          <p:nvSpPr>
+            <p:cNvPr id="38" name="Textfeld 37">
+              <a:extLst>
+                <a:ext uri="{FF2B5EF4-FFF2-40B4-BE49-F238E27FC236}">
+                  <a16:creationId xmlns:a16="http://schemas.microsoft.com/office/drawing/2014/main" id="{89037F7F-0C95-8C4D-34C2-E9FDCC82C65C}"/>
+                </a:ext>
+              </a:extLst>
+            </p:cNvPr>
+            <p:cNvSpPr txBox="1"/>
+            <p:nvPr/>
+          </p:nvSpPr>
+          <p:spPr>
+            <a:xfrm>
+              <a:off x="5905144" y="2320183"/>
+              <a:ext cx="308098" cy="369332"/>
+            </a:xfrm>
+            <a:prstGeom prst="rect">
+              <a:avLst/>
+            </a:prstGeom>
+            <a:noFill/>
+          </p:spPr>
+          <p:txBody>
+            <a:bodyPr wrap="none" rtlCol="0">
+              <a:spAutoFit/>
+            </a:bodyPr>
+            <a:lstStyle/>
+            <a:p>
+              <a:r>
+                <a:rPr lang="de-DE" b="1" dirty="0">
+                  <a:solidFill>
+                    <a:srgbClr val="FF0000"/>
+                  </a:solidFill>
+                </a:rPr>
+                <a:t>0</a:t>
+              </a:r>
+            </a:p>
+          </p:txBody>
+        </p:sp>
+        <p:sp>
+          <p:nvSpPr>
+            <p:cNvPr id="39" name="Textfeld 38">
+              <a:extLst>
+                <a:ext uri="{FF2B5EF4-FFF2-40B4-BE49-F238E27FC236}">
+                  <a16:creationId xmlns:a16="http://schemas.microsoft.com/office/drawing/2014/main" id="{5A85CC7C-73D1-5F7C-698D-A37E1E5E7273}"/>
+                </a:ext>
+              </a:extLst>
+            </p:cNvPr>
+            <p:cNvSpPr txBox="1"/>
+            <p:nvPr/>
+          </p:nvSpPr>
+          <p:spPr>
+            <a:xfrm>
+              <a:off x="6305372" y="2549496"/>
+              <a:ext cx="308098" cy="369332"/>
+            </a:xfrm>
+            <a:prstGeom prst="rect">
+              <a:avLst/>
+            </a:prstGeom>
+            <a:noFill/>
+          </p:spPr>
+          <p:txBody>
+            <a:bodyPr wrap="none" rtlCol="0">
+              <a:spAutoFit/>
+            </a:bodyPr>
+            <a:lstStyle/>
+            <a:p>
+              <a:r>
+                <a:rPr lang="de-DE" b="1" dirty="0">
+                  <a:solidFill>
+                    <a:srgbClr val="FF0000"/>
+                  </a:solidFill>
+                </a:rPr>
+                <a:t>1</a:t>
+              </a:r>
+            </a:p>
+          </p:txBody>
+        </p:sp>
+        <p:sp>
+          <p:nvSpPr>
+            <p:cNvPr id="40" name="Textfeld 39">
+              <a:extLst>
+                <a:ext uri="{FF2B5EF4-FFF2-40B4-BE49-F238E27FC236}">
+                  <a16:creationId xmlns:a16="http://schemas.microsoft.com/office/drawing/2014/main" id="{8F03C146-E0EC-B3AC-B482-53C1F6368EBE}"/>
+                </a:ext>
+              </a:extLst>
+            </p:cNvPr>
+            <p:cNvSpPr txBox="1"/>
+            <p:nvPr/>
+          </p:nvSpPr>
+          <p:spPr>
+            <a:xfrm>
+              <a:off x="6705600" y="2768346"/>
+              <a:ext cx="308098" cy="369332"/>
+            </a:xfrm>
+            <a:prstGeom prst="rect">
+              <a:avLst/>
+            </a:prstGeom>
+            <a:noFill/>
+          </p:spPr>
+          <p:txBody>
+            <a:bodyPr wrap="none" rtlCol="0">
+              <a:spAutoFit/>
+            </a:bodyPr>
+            <a:lstStyle/>
+            <a:p>
+              <a:r>
+                <a:rPr lang="de-DE" b="1" dirty="0">
+                  <a:solidFill>
+                    <a:srgbClr val="FF0000"/>
+                  </a:solidFill>
+                </a:rPr>
+                <a:t>2</a:t>
+              </a:r>
+            </a:p>
+          </p:txBody>
+        </p:sp>
+        <p:sp>
+          <p:nvSpPr>
+            <p:cNvPr id="41" name="Textfeld 40">
+              <a:extLst>
+                <a:ext uri="{FF2B5EF4-FFF2-40B4-BE49-F238E27FC236}">
+                  <a16:creationId xmlns:a16="http://schemas.microsoft.com/office/drawing/2014/main" id="{D00636F6-3821-798B-8EE7-93C2B31842B9}"/>
+                </a:ext>
+              </a:extLst>
+            </p:cNvPr>
+            <p:cNvSpPr txBox="1"/>
+            <p:nvPr/>
+          </p:nvSpPr>
+          <p:spPr>
+            <a:xfrm>
+              <a:off x="6704175" y="3222968"/>
+              <a:ext cx="308098" cy="369332"/>
+            </a:xfrm>
+            <a:prstGeom prst="rect">
+              <a:avLst/>
+            </a:prstGeom>
+            <a:noFill/>
+          </p:spPr>
+          <p:txBody>
+            <a:bodyPr wrap="none" rtlCol="0">
+              <a:spAutoFit/>
+            </a:bodyPr>
+            <a:lstStyle/>
+            <a:p>
+              <a:r>
+                <a:rPr lang="de-DE" b="1" dirty="0">
+                  <a:solidFill>
+                    <a:srgbClr val="FF0000"/>
+                  </a:solidFill>
+                </a:rPr>
+                <a:t>3</a:t>
+              </a:r>
+            </a:p>
+          </p:txBody>
+        </p:sp>
+        <p:sp>
+          <p:nvSpPr>
+            <p:cNvPr id="42" name="Textfeld 41">
+              <a:extLst>
+                <a:ext uri="{FF2B5EF4-FFF2-40B4-BE49-F238E27FC236}">
+                  <a16:creationId xmlns:a16="http://schemas.microsoft.com/office/drawing/2014/main" id="{2AB41984-1FA9-69F3-0B67-727A8A7381AA}"/>
+                </a:ext>
+              </a:extLst>
+            </p:cNvPr>
+            <p:cNvSpPr txBox="1"/>
+            <p:nvPr/>
+          </p:nvSpPr>
+          <p:spPr>
+            <a:xfrm>
+              <a:off x="6704175" y="3677590"/>
+              <a:ext cx="308098" cy="369332"/>
+            </a:xfrm>
+            <a:prstGeom prst="rect">
+              <a:avLst/>
+            </a:prstGeom>
+            <a:noFill/>
+          </p:spPr>
+          <p:txBody>
+            <a:bodyPr wrap="none" rtlCol="0">
+              <a:spAutoFit/>
+            </a:bodyPr>
+            <a:lstStyle/>
+            <a:p>
+              <a:r>
+                <a:rPr lang="de-DE" b="1" dirty="0">
+                  <a:solidFill>
+                    <a:srgbClr val="FF0000"/>
+                  </a:solidFill>
+                </a:rPr>
+                <a:t>4</a:t>
+              </a:r>
+            </a:p>
+          </p:txBody>
+        </p:sp>
+        <p:sp>
+          <p:nvSpPr>
+            <p:cNvPr id="43" name="Textfeld 42">
+              <a:extLst>
+                <a:ext uri="{FF2B5EF4-FFF2-40B4-BE49-F238E27FC236}">
+                  <a16:creationId xmlns:a16="http://schemas.microsoft.com/office/drawing/2014/main" id="{FAD1B013-40E2-297B-1BDE-B3C7B2A1A045}"/>
+                </a:ext>
+              </a:extLst>
+            </p:cNvPr>
+            <p:cNvSpPr txBox="1"/>
+            <p:nvPr/>
+          </p:nvSpPr>
+          <p:spPr>
+            <a:xfrm>
+              <a:off x="6296826" y="3904986"/>
+              <a:ext cx="308098" cy="369332"/>
+            </a:xfrm>
+            <a:prstGeom prst="rect">
+              <a:avLst/>
+            </a:prstGeom>
+            <a:noFill/>
+          </p:spPr>
+          <p:txBody>
+            <a:bodyPr wrap="none" rtlCol="0">
+              <a:spAutoFit/>
+            </a:bodyPr>
+            <a:lstStyle/>
+            <a:p>
+              <a:r>
+                <a:rPr lang="de-DE" b="1" dirty="0">
+                  <a:solidFill>
+                    <a:srgbClr val="FF0000"/>
+                  </a:solidFill>
+                </a:rPr>
+                <a:t>5</a:t>
+              </a:r>
+            </a:p>
+          </p:txBody>
+        </p:sp>
+        <p:sp>
+          <p:nvSpPr>
+            <p:cNvPr id="44" name="Textfeld 43">
+              <a:extLst>
+                <a:ext uri="{FF2B5EF4-FFF2-40B4-BE49-F238E27FC236}">
+                  <a16:creationId xmlns:a16="http://schemas.microsoft.com/office/drawing/2014/main" id="{14FE9DF3-1D47-8055-FB1E-D2A06173D339}"/>
+                </a:ext>
+              </a:extLst>
+            </p:cNvPr>
+            <p:cNvSpPr txBox="1"/>
+            <p:nvPr/>
+          </p:nvSpPr>
+          <p:spPr>
+            <a:xfrm>
+              <a:off x="5905144" y="4151751"/>
+              <a:ext cx="308098" cy="369332"/>
+            </a:xfrm>
+            <a:prstGeom prst="rect">
+              <a:avLst/>
+            </a:prstGeom>
+            <a:noFill/>
+          </p:spPr>
+          <p:txBody>
+            <a:bodyPr wrap="none" rtlCol="0">
+              <a:spAutoFit/>
+            </a:bodyPr>
+            <a:lstStyle/>
+            <a:p>
+              <a:r>
+                <a:rPr lang="de-DE" b="1" dirty="0">
+                  <a:solidFill>
+                    <a:srgbClr val="FF0000"/>
+                  </a:solidFill>
+                </a:rPr>
+                <a:t>6</a:t>
+              </a:r>
+            </a:p>
+          </p:txBody>
+        </p:sp>
+        <p:sp>
+          <p:nvSpPr>
+            <p:cNvPr id="45" name="Textfeld 44">
+              <a:extLst>
+                <a:ext uri="{FF2B5EF4-FFF2-40B4-BE49-F238E27FC236}">
+                  <a16:creationId xmlns:a16="http://schemas.microsoft.com/office/drawing/2014/main" id="{E3030F1F-83F6-D96D-13B9-00D0E6E69A97}"/>
+                </a:ext>
+              </a:extLst>
+            </p:cNvPr>
+            <p:cNvSpPr txBox="1"/>
+            <p:nvPr/>
+          </p:nvSpPr>
+          <p:spPr>
+            <a:xfrm>
+              <a:off x="5500644" y="3909259"/>
+              <a:ext cx="308098" cy="369332"/>
+            </a:xfrm>
+            <a:prstGeom prst="rect">
+              <a:avLst/>
+            </a:prstGeom>
+            <a:noFill/>
+          </p:spPr>
+          <p:txBody>
+            <a:bodyPr wrap="none" rtlCol="0">
+              <a:spAutoFit/>
+            </a:bodyPr>
+            <a:lstStyle/>
+            <a:p>
+              <a:r>
+                <a:rPr lang="de-DE" b="1" dirty="0">
+                  <a:solidFill>
+                    <a:srgbClr val="FF0000"/>
+                  </a:solidFill>
+                </a:rPr>
+                <a:t>7</a:t>
+              </a:r>
+            </a:p>
+          </p:txBody>
+        </p:sp>
+        <p:sp>
+          <p:nvSpPr>
+            <p:cNvPr id="46" name="Textfeld 45">
+              <a:extLst>
+                <a:ext uri="{FF2B5EF4-FFF2-40B4-BE49-F238E27FC236}">
+                  <a16:creationId xmlns:a16="http://schemas.microsoft.com/office/drawing/2014/main" id="{5789CCF3-E4D0-66E0-A19A-437E08D49AE3}"/>
+                </a:ext>
+              </a:extLst>
+            </p:cNvPr>
+            <p:cNvSpPr txBox="1"/>
+            <p:nvPr/>
+          </p:nvSpPr>
+          <p:spPr>
+            <a:xfrm>
+              <a:off x="5102553" y="3677590"/>
+              <a:ext cx="308098" cy="369332"/>
+            </a:xfrm>
+            <a:prstGeom prst="rect">
+              <a:avLst/>
+            </a:prstGeom>
+            <a:noFill/>
+          </p:spPr>
+          <p:txBody>
+            <a:bodyPr wrap="none" rtlCol="0">
+              <a:spAutoFit/>
+            </a:bodyPr>
+            <a:lstStyle/>
+            <a:p>
+              <a:r>
+                <a:rPr lang="de-DE" b="1" dirty="0">
+                  <a:solidFill>
+                    <a:srgbClr val="FF0000"/>
+                  </a:solidFill>
+                </a:rPr>
+                <a:t>8</a:t>
+              </a:r>
+            </a:p>
+          </p:txBody>
+        </p:sp>
+        <p:sp>
+          <p:nvSpPr>
+            <p:cNvPr id="47" name="Textfeld 46">
+              <a:extLst>
+                <a:ext uri="{FF2B5EF4-FFF2-40B4-BE49-F238E27FC236}">
+                  <a16:creationId xmlns:a16="http://schemas.microsoft.com/office/drawing/2014/main" id="{1AC2F52B-E541-4C64-BDE7-94D046B6F6F6}"/>
+                </a:ext>
+              </a:extLst>
+            </p:cNvPr>
+            <p:cNvSpPr txBox="1"/>
+            <p:nvPr/>
+          </p:nvSpPr>
+          <p:spPr>
+            <a:xfrm>
+              <a:off x="5040838" y="2768346"/>
+              <a:ext cx="431528" cy="369332"/>
+            </a:xfrm>
+            <a:prstGeom prst="rect">
+              <a:avLst/>
+            </a:prstGeom>
+            <a:noFill/>
+          </p:spPr>
+          <p:txBody>
+            <a:bodyPr wrap="none" rtlCol="0">
+              <a:spAutoFit/>
+            </a:bodyPr>
+            <a:lstStyle/>
+            <a:p>
+              <a:r>
+                <a:rPr lang="de-DE" b="1" dirty="0">
+                  <a:solidFill>
+                    <a:srgbClr val="FF0000"/>
+                  </a:solidFill>
+                </a:rPr>
+                <a:t>10</a:t>
+              </a:r>
+            </a:p>
+          </p:txBody>
+        </p:sp>
+        <p:sp>
+          <p:nvSpPr>
+            <p:cNvPr id="48" name="Textfeld 47">
+              <a:extLst>
+                <a:ext uri="{FF2B5EF4-FFF2-40B4-BE49-F238E27FC236}">
+                  <a16:creationId xmlns:a16="http://schemas.microsoft.com/office/drawing/2014/main" id="{E87D93A2-1CF6-7628-D565-61E5E4C67495}"/>
+                </a:ext>
+              </a:extLst>
+            </p:cNvPr>
+            <p:cNvSpPr txBox="1"/>
+            <p:nvPr/>
+          </p:nvSpPr>
+          <p:spPr>
+            <a:xfrm>
+              <a:off x="5438929" y="2549496"/>
+              <a:ext cx="431528" cy="369332"/>
+            </a:xfrm>
+            <a:prstGeom prst="rect">
+              <a:avLst/>
+            </a:prstGeom>
+            <a:noFill/>
+          </p:spPr>
+          <p:txBody>
+            <a:bodyPr wrap="none" rtlCol="0">
+              <a:spAutoFit/>
+            </a:bodyPr>
+            <a:lstStyle/>
+            <a:p>
+              <a:r>
+                <a:rPr lang="de-DE" b="1" dirty="0">
+                  <a:solidFill>
+                    <a:srgbClr val="FF0000"/>
+                  </a:solidFill>
+                </a:rPr>
+                <a:t>11</a:t>
+              </a:r>
+            </a:p>
+          </p:txBody>
+        </p:sp>
+        <p:sp>
+          <p:nvSpPr>
+            <p:cNvPr id="49" name="Textfeld 48">
+              <a:extLst>
+                <a:ext uri="{FF2B5EF4-FFF2-40B4-BE49-F238E27FC236}">
+                  <a16:creationId xmlns:a16="http://schemas.microsoft.com/office/drawing/2014/main" id="{3C8A81FC-26D0-DDC2-C9B4-FB68A90A9C15}"/>
+                </a:ext>
+              </a:extLst>
+            </p:cNvPr>
+            <p:cNvSpPr txBox="1"/>
+            <p:nvPr/>
+          </p:nvSpPr>
+          <p:spPr>
+            <a:xfrm>
+              <a:off x="5101338" y="3222968"/>
+              <a:ext cx="308098" cy="369332"/>
+            </a:xfrm>
+            <a:prstGeom prst="rect">
+              <a:avLst/>
+            </a:prstGeom>
+            <a:noFill/>
+          </p:spPr>
+          <p:txBody>
+            <a:bodyPr wrap="none" rtlCol="0">
+              <a:spAutoFit/>
+            </a:bodyPr>
+            <a:lstStyle/>
+            <a:p>
+              <a:r>
+                <a:rPr lang="de-DE" b="1" dirty="0">
+                  <a:solidFill>
+                    <a:srgbClr val="FF0000"/>
+                  </a:solidFill>
+                </a:rPr>
+                <a:t>9</a:t>
+              </a:r>
+            </a:p>
+          </p:txBody>
+        </p:sp>
+      </p:grpSp>
+      <p:grpSp>
+        <p:nvGrpSpPr>
+          <p:cNvPr id="50" name="Gruppieren 49">
+            <a:extLst>
+              <a:ext uri="{FF2B5EF4-FFF2-40B4-BE49-F238E27FC236}">
+                <a16:creationId xmlns:a16="http://schemas.microsoft.com/office/drawing/2014/main" id="{E498DBEA-D132-02B2-96AB-2B9974258F01}"/>
+              </a:ext>
+            </a:extLst>
+          </p:cNvPr>
+          <p:cNvGrpSpPr/>
+          <p:nvPr/>
+        </p:nvGrpSpPr>
+        <p:grpSpPr>
+          <a:xfrm>
+            <a:off x="6444983" y="3536147"/>
+            <a:ext cx="1972860" cy="2200900"/>
+            <a:chOff x="5040838" y="2320183"/>
+            <a:chExt cx="1972860" cy="2200900"/>
+          </a:xfrm>
+        </p:grpSpPr>
+        <p:sp>
+          <p:nvSpPr>
+            <p:cNvPr id="51" name="Textfeld 50">
+              <a:extLst>
+                <a:ext uri="{FF2B5EF4-FFF2-40B4-BE49-F238E27FC236}">
+                  <a16:creationId xmlns:a16="http://schemas.microsoft.com/office/drawing/2014/main" id="{FA71E76C-F405-D54A-DD9B-9C714091013F}"/>
+                </a:ext>
+              </a:extLst>
+            </p:cNvPr>
+            <p:cNvSpPr txBox="1"/>
+            <p:nvPr/>
+          </p:nvSpPr>
+          <p:spPr>
+            <a:xfrm>
+              <a:off x="5905144" y="2320183"/>
+              <a:ext cx="308098" cy="369332"/>
+            </a:xfrm>
+            <a:prstGeom prst="rect">
+              <a:avLst/>
+            </a:prstGeom>
+            <a:noFill/>
+          </p:spPr>
+          <p:txBody>
+            <a:bodyPr wrap="none" rtlCol="0">
+              <a:spAutoFit/>
+            </a:bodyPr>
+            <a:lstStyle/>
+            <a:p>
+              <a:r>
+                <a:rPr lang="de-DE" b="1" dirty="0">
+                  <a:solidFill>
+                    <a:srgbClr val="FF0000"/>
+                  </a:solidFill>
+                </a:rPr>
+                <a:t>0</a:t>
+              </a:r>
+            </a:p>
+          </p:txBody>
+        </p:sp>
+        <p:sp>
+          <p:nvSpPr>
+            <p:cNvPr id="52" name="Textfeld 51">
+              <a:extLst>
+                <a:ext uri="{FF2B5EF4-FFF2-40B4-BE49-F238E27FC236}">
+                  <a16:creationId xmlns:a16="http://schemas.microsoft.com/office/drawing/2014/main" id="{F9E007E4-ECAA-CF79-820E-D0BE17B1C44B}"/>
+                </a:ext>
+              </a:extLst>
+            </p:cNvPr>
+            <p:cNvSpPr txBox="1"/>
+            <p:nvPr/>
+          </p:nvSpPr>
+          <p:spPr>
+            <a:xfrm>
+              <a:off x="6305372" y="2549496"/>
+              <a:ext cx="308098" cy="369332"/>
+            </a:xfrm>
+            <a:prstGeom prst="rect">
+              <a:avLst/>
+            </a:prstGeom>
+            <a:noFill/>
+          </p:spPr>
+          <p:txBody>
+            <a:bodyPr wrap="none" rtlCol="0">
+              <a:spAutoFit/>
+            </a:bodyPr>
+            <a:lstStyle/>
+            <a:p>
+              <a:r>
+                <a:rPr lang="de-DE" b="1" dirty="0">
+                  <a:solidFill>
+                    <a:srgbClr val="FF0000"/>
+                  </a:solidFill>
+                </a:rPr>
+                <a:t>1</a:t>
+              </a:r>
+            </a:p>
+          </p:txBody>
+        </p:sp>
+        <p:sp>
+          <p:nvSpPr>
+            <p:cNvPr id="53" name="Textfeld 52">
+              <a:extLst>
+                <a:ext uri="{FF2B5EF4-FFF2-40B4-BE49-F238E27FC236}">
+                  <a16:creationId xmlns:a16="http://schemas.microsoft.com/office/drawing/2014/main" id="{A7CFECB2-6B05-3482-3D49-4B41F1CDDA6D}"/>
+                </a:ext>
+              </a:extLst>
+            </p:cNvPr>
+            <p:cNvSpPr txBox="1"/>
+            <p:nvPr/>
+          </p:nvSpPr>
+          <p:spPr>
+            <a:xfrm>
+              <a:off x="6705600" y="2768346"/>
+              <a:ext cx="308098" cy="369332"/>
+            </a:xfrm>
+            <a:prstGeom prst="rect">
+              <a:avLst/>
+            </a:prstGeom>
+            <a:noFill/>
+          </p:spPr>
+          <p:txBody>
+            <a:bodyPr wrap="none" rtlCol="0">
+              <a:spAutoFit/>
+            </a:bodyPr>
+            <a:lstStyle/>
+            <a:p>
+              <a:r>
+                <a:rPr lang="de-DE" b="1" dirty="0">
+                  <a:solidFill>
+                    <a:srgbClr val="FF0000"/>
+                  </a:solidFill>
+                </a:rPr>
+                <a:t>2</a:t>
+              </a:r>
+            </a:p>
+          </p:txBody>
+        </p:sp>
+        <p:sp>
+          <p:nvSpPr>
+            <p:cNvPr id="54" name="Textfeld 53">
+              <a:extLst>
+                <a:ext uri="{FF2B5EF4-FFF2-40B4-BE49-F238E27FC236}">
+                  <a16:creationId xmlns:a16="http://schemas.microsoft.com/office/drawing/2014/main" id="{2AE2E2A1-A7C2-1CD0-0BB2-B98DCEB39A44}"/>
+                </a:ext>
+              </a:extLst>
+            </p:cNvPr>
+            <p:cNvSpPr txBox="1"/>
+            <p:nvPr/>
+          </p:nvSpPr>
+          <p:spPr>
+            <a:xfrm>
+              <a:off x="6704175" y="3222968"/>
+              <a:ext cx="308098" cy="369332"/>
+            </a:xfrm>
+            <a:prstGeom prst="rect">
+              <a:avLst/>
+            </a:prstGeom>
+            <a:noFill/>
+          </p:spPr>
+          <p:txBody>
+            <a:bodyPr wrap="none" rtlCol="0">
+              <a:spAutoFit/>
+            </a:bodyPr>
+            <a:lstStyle/>
+            <a:p>
+              <a:r>
+                <a:rPr lang="de-DE" b="1" dirty="0">
+                  <a:solidFill>
+                    <a:srgbClr val="FF0000"/>
+                  </a:solidFill>
+                </a:rPr>
+                <a:t>3</a:t>
+              </a:r>
+            </a:p>
+          </p:txBody>
+        </p:sp>
+        <p:sp>
+          <p:nvSpPr>
+            <p:cNvPr id="55" name="Textfeld 54">
+              <a:extLst>
+                <a:ext uri="{FF2B5EF4-FFF2-40B4-BE49-F238E27FC236}">
+                  <a16:creationId xmlns:a16="http://schemas.microsoft.com/office/drawing/2014/main" id="{8B92D87C-9067-3987-2789-5E5A6A67B6EC}"/>
+                </a:ext>
+              </a:extLst>
+            </p:cNvPr>
+            <p:cNvSpPr txBox="1"/>
+            <p:nvPr/>
+          </p:nvSpPr>
+          <p:spPr>
+            <a:xfrm>
+              <a:off x="6704175" y="3677590"/>
+              <a:ext cx="308098" cy="369332"/>
+            </a:xfrm>
+            <a:prstGeom prst="rect">
+              <a:avLst/>
+            </a:prstGeom>
+            <a:noFill/>
+          </p:spPr>
+          <p:txBody>
+            <a:bodyPr wrap="none" rtlCol="0">
+              <a:spAutoFit/>
+            </a:bodyPr>
+            <a:lstStyle/>
+            <a:p>
+              <a:r>
+                <a:rPr lang="de-DE" b="1" dirty="0">
+                  <a:solidFill>
+                    <a:srgbClr val="FF0000"/>
+                  </a:solidFill>
+                </a:rPr>
+                <a:t>4</a:t>
+              </a:r>
+            </a:p>
+          </p:txBody>
+        </p:sp>
+        <p:sp>
+          <p:nvSpPr>
+            <p:cNvPr id="56" name="Textfeld 55">
+              <a:extLst>
+                <a:ext uri="{FF2B5EF4-FFF2-40B4-BE49-F238E27FC236}">
+                  <a16:creationId xmlns:a16="http://schemas.microsoft.com/office/drawing/2014/main" id="{BC710400-6780-0259-4BA9-3B074F1582C8}"/>
+                </a:ext>
+              </a:extLst>
+            </p:cNvPr>
+            <p:cNvSpPr txBox="1"/>
+            <p:nvPr/>
+          </p:nvSpPr>
+          <p:spPr>
+            <a:xfrm>
+              <a:off x="6296826" y="3904986"/>
+              <a:ext cx="308098" cy="369332"/>
+            </a:xfrm>
+            <a:prstGeom prst="rect">
+              <a:avLst/>
+            </a:prstGeom>
+            <a:noFill/>
+          </p:spPr>
+          <p:txBody>
+            <a:bodyPr wrap="none" rtlCol="0">
+              <a:spAutoFit/>
+            </a:bodyPr>
+            <a:lstStyle/>
+            <a:p>
+              <a:r>
+                <a:rPr lang="de-DE" b="1" dirty="0">
+                  <a:solidFill>
+                    <a:srgbClr val="FF0000"/>
+                  </a:solidFill>
+                </a:rPr>
+                <a:t>5</a:t>
+              </a:r>
+            </a:p>
+          </p:txBody>
+        </p:sp>
+        <p:sp>
+          <p:nvSpPr>
+            <p:cNvPr id="57" name="Textfeld 56">
+              <a:extLst>
+                <a:ext uri="{FF2B5EF4-FFF2-40B4-BE49-F238E27FC236}">
+                  <a16:creationId xmlns:a16="http://schemas.microsoft.com/office/drawing/2014/main" id="{779111B6-6C99-C38F-85A5-C7733044F1AF}"/>
+                </a:ext>
+              </a:extLst>
+            </p:cNvPr>
+            <p:cNvSpPr txBox="1"/>
+            <p:nvPr/>
+          </p:nvSpPr>
+          <p:spPr>
+            <a:xfrm>
+              <a:off x="5905144" y="4151751"/>
+              <a:ext cx="308098" cy="369332"/>
+            </a:xfrm>
+            <a:prstGeom prst="rect">
+              <a:avLst/>
+            </a:prstGeom>
+            <a:noFill/>
+          </p:spPr>
+          <p:txBody>
+            <a:bodyPr wrap="none" rtlCol="0">
+              <a:spAutoFit/>
+            </a:bodyPr>
+            <a:lstStyle/>
+            <a:p>
+              <a:r>
+                <a:rPr lang="de-DE" b="1" dirty="0">
+                  <a:solidFill>
+                    <a:srgbClr val="FF0000"/>
+                  </a:solidFill>
+                </a:rPr>
+                <a:t>6</a:t>
+              </a:r>
+            </a:p>
+          </p:txBody>
+        </p:sp>
+        <p:sp>
+          <p:nvSpPr>
+            <p:cNvPr id="58" name="Textfeld 57">
+              <a:extLst>
+                <a:ext uri="{FF2B5EF4-FFF2-40B4-BE49-F238E27FC236}">
+                  <a16:creationId xmlns:a16="http://schemas.microsoft.com/office/drawing/2014/main" id="{97809886-8DAB-3D72-7556-2B34FE1CD698}"/>
+                </a:ext>
+              </a:extLst>
+            </p:cNvPr>
+            <p:cNvSpPr txBox="1"/>
+            <p:nvPr/>
+          </p:nvSpPr>
+          <p:spPr>
+            <a:xfrm>
+              <a:off x="5500644" y="3909259"/>
+              <a:ext cx="308098" cy="369332"/>
+            </a:xfrm>
+            <a:prstGeom prst="rect">
+              <a:avLst/>
+            </a:prstGeom>
+            <a:noFill/>
+          </p:spPr>
+          <p:txBody>
+            <a:bodyPr wrap="none" rtlCol="0">
+              <a:spAutoFit/>
+            </a:bodyPr>
+            <a:lstStyle/>
+            <a:p>
+              <a:r>
+                <a:rPr lang="de-DE" b="1" dirty="0">
+                  <a:solidFill>
+                    <a:srgbClr val="FF0000"/>
+                  </a:solidFill>
+                </a:rPr>
+                <a:t>7</a:t>
+              </a:r>
+            </a:p>
+          </p:txBody>
+        </p:sp>
+        <p:sp>
+          <p:nvSpPr>
+            <p:cNvPr id="59" name="Textfeld 58">
+              <a:extLst>
+                <a:ext uri="{FF2B5EF4-FFF2-40B4-BE49-F238E27FC236}">
+                  <a16:creationId xmlns:a16="http://schemas.microsoft.com/office/drawing/2014/main" id="{CAAD6A6F-F33B-6A06-469F-F283D82D36B7}"/>
+                </a:ext>
+              </a:extLst>
+            </p:cNvPr>
+            <p:cNvSpPr txBox="1"/>
+            <p:nvPr/>
+          </p:nvSpPr>
+          <p:spPr>
+            <a:xfrm>
+              <a:off x="5102553" y="3677590"/>
+              <a:ext cx="308098" cy="369332"/>
+            </a:xfrm>
+            <a:prstGeom prst="rect">
+              <a:avLst/>
+            </a:prstGeom>
+            <a:noFill/>
+          </p:spPr>
+          <p:txBody>
+            <a:bodyPr wrap="none" rtlCol="0">
+              <a:spAutoFit/>
+            </a:bodyPr>
+            <a:lstStyle/>
+            <a:p>
+              <a:r>
+                <a:rPr lang="de-DE" b="1" dirty="0">
+                  <a:solidFill>
+                    <a:srgbClr val="FF0000"/>
+                  </a:solidFill>
+                </a:rPr>
+                <a:t>8</a:t>
+              </a:r>
+            </a:p>
+          </p:txBody>
+        </p:sp>
+        <p:sp>
+          <p:nvSpPr>
+            <p:cNvPr id="60" name="Textfeld 59">
+              <a:extLst>
+                <a:ext uri="{FF2B5EF4-FFF2-40B4-BE49-F238E27FC236}">
+                  <a16:creationId xmlns:a16="http://schemas.microsoft.com/office/drawing/2014/main" id="{52D3B5E6-E42E-4D03-2C14-60FD8A161989}"/>
+                </a:ext>
+              </a:extLst>
+            </p:cNvPr>
+            <p:cNvSpPr txBox="1"/>
+            <p:nvPr/>
+          </p:nvSpPr>
+          <p:spPr>
+            <a:xfrm>
+              <a:off x="5040838" y="2768346"/>
+              <a:ext cx="431528" cy="369332"/>
+            </a:xfrm>
+            <a:prstGeom prst="rect">
+              <a:avLst/>
+            </a:prstGeom>
+            <a:noFill/>
+          </p:spPr>
+          <p:txBody>
+            <a:bodyPr wrap="none" rtlCol="0">
+              <a:spAutoFit/>
+            </a:bodyPr>
+            <a:lstStyle/>
+            <a:p>
+              <a:r>
+                <a:rPr lang="de-DE" b="1" dirty="0">
+                  <a:solidFill>
+                    <a:srgbClr val="FF0000"/>
+                  </a:solidFill>
+                </a:rPr>
+                <a:t>10</a:t>
+              </a:r>
+            </a:p>
+          </p:txBody>
+        </p:sp>
+        <p:sp>
+          <p:nvSpPr>
+            <p:cNvPr id="61" name="Textfeld 60">
+              <a:extLst>
+                <a:ext uri="{FF2B5EF4-FFF2-40B4-BE49-F238E27FC236}">
+                  <a16:creationId xmlns:a16="http://schemas.microsoft.com/office/drawing/2014/main" id="{05738142-5D3E-2595-3CCF-B2F4E332E967}"/>
+                </a:ext>
+              </a:extLst>
+            </p:cNvPr>
+            <p:cNvSpPr txBox="1"/>
+            <p:nvPr/>
+          </p:nvSpPr>
+          <p:spPr>
+            <a:xfrm>
+              <a:off x="5438929" y="2549496"/>
+              <a:ext cx="431528" cy="369332"/>
+            </a:xfrm>
+            <a:prstGeom prst="rect">
+              <a:avLst/>
+            </a:prstGeom>
+            <a:noFill/>
+          </p:spPr>
+          <p:txBody>
+            <a:bodyPr wrap="none" rtlCol="0">
+              <a:spAutoFit/>
+            </a:bodyPr>
+            <a:lstStyle/>
+            <a:p>
+              <a:r>
+                <a:rPr lang="de-DE" b="1" dirty="0">
+                  <a:solidFill>
+                    <a:srgbClr val="FF0000"/>
+                  </a:solidFill>
+                </a:rPr>
+                <a:t>11</a:t>
+              </a:r>
+            </a:p>
+          </p:txBody>
+        </p:sp>
+        <p:sp>
+          <p:nvSpPr>
+            <p:cNvPr id="62" name="Textfeld 61">
+              <a:extLst>
+                <a:ext uri="{FF2B5EF4-FFF2-40B4-BE49-F238E27FC236}">
+                  <a16:creationId xmlns:a16="http://schemas.microsoft.com/office/drawing/2014/main" id="{6166CBAA-7529-C699-6EEC-716E75960330}"/>
+                </a:ext>
+              </a:extLst>
+            </p:cNvPr>
+            <p:cNvSpPr txBox="1"/>
+            <p:nvPr/>
+          </p:nvSpPr>
+          <p:spPr>
+            <a:xfrm>
+              <a:off x="5101338" y="3222968"/>
+              <a:ext cx="308098" cy="369332"/>
+            </a:xfrm>
+            <a:prstGeom prst="rect">
+              <a:avLst/>
+            </a:prstGeom>
+            <a:noFill/>
+          </p:spPr>
+          <p:txBody>
+            <a:bodyPr wrap="none" rtlCol="0">
+              <a:spAutoFit/>
+            </a:bodyPr>
+            <a:lstStyle/>
+            <a:p>
+              <a:r>
+                <a:rPr lang="de-DE" b="1" dirty="0">
+                  <a:solidFill>
+                    <a:srgbClr val="FF0000"/>
+                  </a:solidFill>
+                </a:rPr>
+                <a:t>9</a:t>
+              </a:r>
+            </a:p>
+          </p:txBody>
+        </p:sp>
+      </p:grpSp>
+      <p:grpSp>
+        <p:nvGrpSpPr>
+          <p:cNvPr id="63" name="Gruppieren 62">
+            <a:extLst>
+              <a:ext uri="{FF2B5EF4-FFF2-40B4-BE49-F238E27FC236}">
+                <a16:creationId xmlns:a16="http://schemas.microsoft.com/office/drawing/2014/main" id="{40DC3321-30D6-22B2-37D5-7A148FE0C734}"/>
+              </a:ext>
+            </a:extLst>
+          </p:cNvPr>
+          <p:cNvGrpSpPr/>
+          <p:nvPr/>
+        </p:nvGrpSpPr>
+        <p:grpSpPr>
+          <a:xfrm>
+            <a:off x="4547943" y="4177780"/>
+            <a:ext cx="1972860" cy="2200900"/>
+            <a:chOff x="5040838" y="2320183"/>
+            <a:chExt cx="1972860" cy="2200900"/>
+          </a:xfrm>
+        </p:grpSpPr>
+        <p:sp>
+          <p:nvSpPr>
+            <p:cNvPr id="64" name="Textfeld 63">
+              <a:extLst>
+                <a:ext uri="{FF2B5EF4-FFF2-40B4-BE49-F238E27FC236}">
+                  <a16:creationId xmlns:a16="http://schemas.microsoft.com/office/drawing/2014/main" id="{F1F15A47-03B5-EA00-1860-0A489B42E3D6}"/>
+                </a:ext>
+              </a:extLst>
+            </p:cNvPr>
+            <p:cNvSpPr txBox="1"/>
+            <p:nvPr/>
+          </p:nvSpPr>
+          <p:spPr>
+            <a:xfrm>
+              <a:off x="5905144" y="2320183"/>
+              <a:ext cx="308098" cy="369332"/>
+            </a:xfrm>
+            <a:prstGeom prst="rect">
+              <a:avLst/>
+            </a:prstGeom>
+            <a:noFill/>
+          </p:spPr>
+          <p:txBody>
+            <a:bodyPr wrap="none" rtlCol="0">
+              <a:spAutoFit/>
+            </a:bodyPr>
+            <a:lstStyle/>
+            <a:p>
+              <a:r>
+                <a:rPr lang="de-DE" b="1" dirty="0">
+                  <a:solidFill>
+                    <a:srgbClr val="FF0000"/>
+                  </a:solidFill>
+                </a:rPr>
+                <a:t>0</a:t>
+              </a:r>
+            </a:p>
+          </p:txBody>
+        </p:sp>
+        <p:sp>
+          <p:nvSpPr>
+            <p:cNvPr id="65" name="Textfeld 64">
+              <a:extLst>
+                <a:ext uri="{FF2B5EF4-FFF2-40B4-BE49-F238E27FC236}">
+                  <a16:creationId xmlns:a16="http://schemas.microsoft.com/office/drawing/2014/main" id="{B3608323-1F81-4072-AA5A-B8155550A023}"/>
+                </a:ext>
+              </a:extLst>
+            </p:cNvPr>
+            <p:cNvSpPr txBox="1"/>
+            <p:nvPr/>
+          </p:nvSpPr>
+          <p:spPr>
+            <a:xfrm>
+              <a:off x="6305372" y="2549496"/>
+              <a:ext cx="308098" cy="369332"/>
+            </a:xfrm>
+            <a:prstGeom prst="rect">
+              <a:avLst/>
+            </a:prstGeom>
+            <a:noFill/>
+          </p:spPr>
+          <p:txBody>
+            <a:bodyPr wrap="none" rtlCol="0">
+              <a:spAutoFit/>
+            </a:bodyPr>
+            <a:lstStyle/>
+            <a:p>
+              <a:r>
+                <a:rPr lang="de-DE" b="1" dirty="0">
+                  <a:solidFill>
+                    <a:srgbClr val="FF0000"/>
+                  </a:solidFill>
+                </a:rPr>
+                <a:t>1</a:t>
+              </a:r>
+            </a:p>
+          </p:txBody>
+        </p:sp>
+        <p:sp>
+          <p:nvSpPr>
+            <p:cNvPr id="66" name="Textfeld 65">
+              <a:extLst>
+                <a:ext uri="{FF2B5EF4-FFF2-40B4-BE49-F238E27FC236}">
+                  <a16:creationId xmlns:a16="http://schemas.microsoft.com/office/drawing/2014/main" id="{EF59948F-5293-8FC8-0C8D-3212029F05E4}"/>
+                </a:ext>
+              </a:extLst>
+            </p:cNvPr>
+            <p:cNvSpPr txBox="1"/>
+            <p:nvPr/>
+          </p:nvSpPr>
+          <p:spPr>
+            <a:xfrm>
+              <a:off x="6705600" y="2768346"/>
+              <a:ext cx="308098" cy="369332"/>
+            </a:xfrm>
+            <a:prstGeom prst="rect">
+              <a:avLst/>
+            </a:prstGeom>
+            <a:noFill/>
+          </p:spPr>
+          <p:txBody>
+            <a:bodyPr wrap="none" rtlCol="0">
+              <a:spAutoFit/>
+            </a:bodyPr>
+            <a:lstStyle/>
+            <a:p>
+              <a:r>
+                <a:rPr lang="de-DE" b="1" dirty="0">
+                  <a:solidFill>
+                    <a:srgbClr val="FF0000"/>
+                  </a:solidFill>
+                </a:rPr>
+                <a:t>2</a:t>
+              </a:r>
+            </a:p>
+          </p:txBody>
+        </p:sp>
+        <p:sp>
+          <p:nvSpPr>
+            <p:cNvPr id="67" name="Textfeld 66">
+              <a:extLst>
+                <a:ext uri="{FF2B5EF4-FFF2-40B4-BE49-F238E27FC236}">
+                  <a16:creationId xmlns:a16="http://schemas.microsoft.com/office/drawing/2014/main" id="{F7D6B775-34E4-0BE9-4E26-5431E55BDCC8}"/>
+                </a:ext>
+              </a:extLst>
+            </p:cNvPr>
+            <p:cNvSpPr txBox="1"/>
+            <p:nvPr/>
+          </p:nvSpPr>
+          <p:spPr>
+            <a:xfrm>
+              <a:off x="6704175" y="3222968"/>
+              <a:ext cx="308098" cy="369332"/>
+            </a:xfrm>
+            <a:prstGeom prst="rect">
+              <a:avLst/>
+            </a:prstGeom>
+            <a:noFill/>
+          </p:spPr>
+          <p:txBody>
+            <a:bodyPr wrap="none" rtlCol="0">
+              <a:spAutoFit/>
+            </a:bodyPr>
+            <a:lstStyle/>
+            <a:p>
+              <a:r>
+                <a:rPr lang="de-DE" b="1" dirty="0">
+                  <a:solidFill>
+                    <a:srgbClr val="FF0000"/>
+                  </a:solidFill>
+                </a:rPr>
+                <a:t>3</a:t>
+              </a:r>
+            </a:p>
+          </p:txBody>
+        </p:sp>
+        <p:sp>
+          <p:nvSpPr>
+            <p:cNvPr id="68" name="Textfeld 67">
+              <a:extLst>
+                <a:ext uri="{FF2B5EF4-FFF2-40B4-BE49-F238E27FC236}">
+                  <a16:creationId xmlns:a16="http://schemas.microsoft.com/office/drawing/2014/main" id="{A8226157-1D3C-8A16-175A-A6D3C1EE8C21}"/>
+                </a:ext>
+              </a:extLst>
+            </p:cNvPr>
+            <p:cNvSpPr txBox="1"/>
+            <p:nvPr/>
+          </p:nvSpPr>
+          <p:spPr>
+            <a:xfrm>
+              <a:off x="6704175" y="3677590"/>
+              <a:ext cx="308098" cy="369332"/>
+            </a:xfrm>
+            <a:prstGeom prst="rect">
+              <a:avLst/>
+            </a:prstGeom>
+            <a:noFill/>
+          </p:spPr>
+          <p:txBody>
+            <a:bodyPr wrap="none" rtlCol="0">
+              <a:spAutoFit/>
+            </a:bodyPr>
+            <a:lstStyle/>
+            <a:p>
+              <a:r>
+                <a:rPr lang="de-DE" b="1" dirty="0">
+                  <a:solidFill>
+                    <a:srgbClr val="FF0000"/>
+                  </a:solidFill>
+                </a:rPr>
+                <a:t>4</a:t>
+              </a:r>
+            </a:p>
+          </p:txBody>
+        </p:sp>
+        <p:sp>
+          <p:nvSpPr>
+            <p:cNvPr id="69" name="Textfeld 68">
+              <a:extLst>
+                <a:ext uri="{FF2B5EF4-FFF2-40B4-BE49-F238E27FC236}">
+                  <a16:creationId xmlns:a16="http://schemas.microsoft.com/office/drawing/2014/main" id="{7DC203C9-EDF3-B7CC-6527-9AA9E58ECF7E}"/>
+                </a:ext>
+              </a:extLst>
+            </p:cNvPr>
+            <p:cNvSpPr txBox="1"/>
+            <p:nvPr/>
+          </p:nvSpPr>
+          <p:spPr>
+            <a:xfrm>
+              <a:off x="6296826" y="3904986"/>
+              <a:ext cx="308098" cy="369332"/>
+            </a:xfrm>
+            <a:prstGeom prst="rect">
+              <a:avLst/>
+            </a:prstGeom>
+            <a:noFill/>
+          </p:spPr>
+          <p:txBody>
+            <a:bodyPr wrap="none" rtlCol="0">
+              <a:spAutoFit/>
+            </a:bodyPr>
+            <a:lstStyle/>
+            <a:p>
+              <a:r>
+                <a:rPr lang="de-DE" b="1" dirty="0">
+                  <a:solidFill>
+                    <a:srgbClr val="FF0000"/>
+                  </a:solidFill>
+                </a:rPr>
+                <a:t>5</a:t>
+              </a:r>
+            </a:p>
+          </p:txBody>
+        </p:sp>
+        <p:sp>
+          <p:nvSpPr>
+            <p:cNvPr id="70" name="Textfeld 69">
+              <a:extLst>
+                <a:ext uri="{FF2B5EF4-FFF2-40B4-BE49-F238E27FC236}">
+                  <a16:creationId xmlns:a16="http://schemas.microsoft.com/office/drawing/2014/main" id="{CAB0A187-6807-A55E-7DBD-07F647AD5645}"/>
+                </a:ext>
+              </a:extLst>
+            </p:cNvPr>
+            <p:cNvSpPr txBox="1"/>
+            <p:nvPr/>
+          </p:nvSpPr>
+          <p:spPr>
+            <a:xfrm>
+              <a:off x="5905144" y="4151751"/>
+              <a:ext cx="308098" cy="369332"/>
+            </a:xfrm>
+            <a:prstGeom prst="rect">
+              <a:avLst/>
+            </a:prstGeom>
+            <a:noFill/>
+          </p:spPr>
+          <p:txBody>
+            <a:bodyPr wrap="none" rtlCol="0">
+              <a:spAutoFit/>
+            </a:bodyPr>
+            <a:lstStyle/>
+            <a:p>
+              <a:r>
+                <a:rPr lang="de-DE" b="1" dirty="0">
+                  <a:solidFill>
+                    <a:srgbClr val="FF0000"/>
+                  </a:solidFill>
+                </a:rPr>
+                <a:t>6</a:t>
+              </a:r>
+            </a:p>
+          </p:txBody>
+        </p:sp>
+        <p:sp>
+          <p:nvSpPr>
+            <p:cNvPr id="71" name="Textfeld 70">
+              <a:extLst>
+                <a:ext uri="{FF2B5EF4-FFF2-40B4-BE49-F238E27FC236}">
+                  <a16:creationId xmlns:a16="http://schemas.microsoft.com/office/drawing/2014/main" id="{04C65ADF-3EFE-7659-178D-CFF5732DF33C}"/>
+                </a:ext>
+              </a:extLst>
+            </p:cNvPr>
+            <p:cNvSpPr txBox="1"/>
+            <p:nvPr/>
+          </p:nvSpPr>
+          <p:spPr>
+            <a:xfrm>
+              <a:off x="5500644" y="3909259"/>
+              <a:ext cx="308098" cy="369332"/>
+            </a:xfrm>
+            <a:prstGeom prst="rect">
+              <a:avLst/>
+            </a:prstGeom>
+            <a:noFill/>
+          </p:spPr>
+          <p:txBody>
+            <a:bodyPr wrap="none" rtlCol="0">
+              <a:spAutoFit/>
+            </a:bodyPr>
+            <a:lstStyle/>
+            <a:p>
+              <a:r>
+                <a:rPr lang="de-DE" b="1" dirty="0">
+                  <a:solidFill>
+                    <a:srgbClr val="FF0000"/>
+                  </a:solidFill>
+                </a:rPr>
+                <a:t>7</a:t>
+              </a:r>
+            </a:p>
+          </p:txBody>
+        </p:sp>
+        <p:sp>
+          <p:nvSpPr>
+            <p:cNvPr id="72" name="Textfeld 71">
+              <a:extLst>
+                <a:ext uri="{FF2B5EF4-FFF2-40B4-BE49-F238E27FC236}">
+                  <a16:creationId xmlns:a16="http://schemas.microsoft.com/office/drawing/2014/main" id="{104E779B-111B-76DD-43B3-688A94903F7B}"/>
+                </a:ext>
+              </a:extLst>
+            </p:cNvPr>
+            <p:cNvSpPr txBox="1"/>
+            <p:nvPr/>
+          </p:nvSpPr>
+          <p:spPr>
+            <a:xfrm>
+              <a:off x="5102553" y="3677590"/>
+              <a:ext cx="308098" cy="369332"/>
+            </a:xfrm>
+            <a:prstGeom prst="rect">
+              <a:avLst/>
+            </a:prstGeom>
+            <a:noFill/>
+          </p:spPr>
+          <p:txBody>
+            <a:bodyPr wrap="none" rtlCol="0">
+              <a:spAutoFit/>
+            </a:bodyPr>
+            <a:lstStyle/>
+            <a:p>
+              <a:r>
+                <a:rPr lang="de-DE" b="1" dirty="0">
+                  <a:solidFill>
+                    <a:srgbClr val="FF0000"/>
+                  </a:solidFill>
+                </a:rPr>
+                <a:t>8</a:t>
+              </a:r>
+            </a:p>
+          </p:txBody>
+        </p:sp>
+        <p:sp>
+          <p:nvSpPr>
+            <p:cNvPr id="73" name="Textfeld 72">
+              <a:extLst>
+                <a:ext uri="{FF2B5EF4-FFF2-40B4-BE49-F238E27FC236}">
+                  <a16:creationId xmlns:a16="http://schemas.microsoft.com/office/drawing/2014/main" id="{CFB4A569-AFE4-1DA5-3FE5-3D3FFCBC9868}"/>
+                </a:ext>
+              </a:extLst>
+            </p:cNvPr>
+            <p:cNvSpPr txBox="1"/>
+            <p:nvPr/>
+          </p:nvSpPr>
+          <p:spPr>
+            <a:xfrm>
+              <a:off x="5040838" y="2768346"/>
+              <a:ext cx="431528" cy="369332"/>
+            </a:xfrm>
+            <a:prstGeom prst="rect">
+              <a:avLst/>
+            </a:prstGeom>
+            <a:noFill/>
+          </p:spPr>
+          <p:txBody>
+            <a:bodyPr wrap="none" rtlCol="0">
+              <a:spAutoFit/>
+            </a:bodyPr>
+            <a:lstStyle/>
+            <a:p>
+              <a:r>
+                <a:rPr lang="de-DE" b="1" dirty="0">
+                  <a:solidFill>
+                    <a:srgbClr val="FF0000"/>
+                  </a:solidFill>
+                </a:rPr>
+                <a:t>10</a:t>
+              </a:r>
+            </a:p>
+          </p:txBody>
+        </p:sp>
+        <p:sp>
+          <p:nvSpPr>
+            <p:cNvPr id="74" name="Textfeld 73">
+              <a:extLst>
+                <a:ext uri="{FF2B5EF4-FFF2-40B4-BE49-F238E27FC236}">
+                  <a16:creationId xmlns:a16="http://schemas.microsoft.com/office/drawing/2014/main" id="{2E0AC2A1-D388-C35C-A77E-C0527A48FB1B}"/>
+                </a:ext>
+              </a:extLst>
+            </p:cNvPr>
+            <p:cNvSpPr txBox="1"/>
+            <p:nvPr/>
+          </p:nvSpPr>
+          <p:spPr>
+            <a:xfrm>
+              <a:off x="5438929" y="2549496"/>
+              <a:ext cx="431528" cy="369332"/>
+            </a:xfrm>
+            <a:prstGeom prst="rect">
+              <a:avLst/>
+            </a:prstGeom>
+            <a:noFill/>
+          </p:spPr>
+          <p:txBody>
+            <a:bodyPr wrap="none" rtlCol="0">
+              <a:spAutoFit/>
+            </a:bodyPr>
+            <a:lstStyle/>
+            <a:p>
+              <a:r>
+                <a:rPr lang="de-DE" b="1" dirty="0">
+                  <a:solidFill>
+                    <a:srgbClr val="FF0000"/>
+                  </a:solidFill>
+                </a:rPr>
+                <a:t>11</a:t>
+              </a:r>
+            </a:p>
+          </p:txBody>
+        </p:sp>
+        <p:sp>
+          <p:nvSpPr>
+            <p:cNvPr id="75" name="Textfeld 74">
+              <a:extLst>
+                <a:ext uri="{FF2B5EF4-FFF2-40B4-BE49-F238E27FC236}">
+                  <a16:creationId xmlns:a16="http://schemas.microsoft.com/office/drawing/2014/main" id="{A0A2E2BB-4168-5C4E-B42A-22A1FF5081B6}"/>
+                </a:ext>
+              </a:extLst>
+            </p:cNvPr>
+            <p:cNvSpPr txBox="1"/>
+            <p:nvPr/>
+          </p:nvSpPr>
+          <p:spPr>
+            <a:xfrm>
+              <a:off x="5101338" y="3222968"/>
+              <a:ext cx="308098" cy="369332"/>
+            </a:xfrm>
+            <a:prstGeom prst="rect">
+              <a:avLst/>
+            </a:prstGeom>
+            <a:noFill/>
+          </p:spPr>
+          <p:txBody>
+            <a:bodyPr wrap="none" rtlCol="0">
+              <a:spAutoFit/>
+            </a:bodyPr>
+            <a:lstStyle/>
+            <a:p>
+              <a:r>
+                <a:rPr lang="de-DE" b="1" dirty="0">
+                  <a:solidFill>
+                    <a:srgbClr val="FF0000"/>
+                  </a:solidFill>
+                </a:rPr>
+                <a:t>9</a:t>
+              </a:r>
+            </a:p>
+          </p:txBody>
+        </p:sp>
+      </p:grpSp>
+      <p:grpSp>
+        <p:nvGrpSpPr>
+          <p:cNvPr id="76" name="Gruppieren 75">
+            <a:extLst>
+              <a:ext uri="{FF2B5EF4-FFF2-40B4-BE49-F238E27FC236}">
+                <a16:creationId xmlns:a16="http://schemas.microsoft.com/office/drawing/2014/main" id="{9CFB2B7F-DE33-9296-BA2D-49908068542A}"/>
+              </a:ext>
+            </a:extLst>
+          </p:cNvPr>
+          <p:cNvGrpSpPr/>
+          <p:nvPr/>
+        </p:nvGrpSpPr>
+        <p:grpSpPr>
+          <a:xfrm>
+            <a:off x="6885748" y="1518231"/>
+            <a:ext cx="1972860" cy="2200900"/>
+            <a:chOff x="5040838" y="2320183"/>
+            <a:chExt cx="1972860" cy="2200900"/>
+          </a:xfrm>
+        </p:grpSpPr>
+        <p:sp>
+          <p:nvSpPr>
+            <p:cNvPr id="77" name="Textfeld 76">
+              <a:extLst>
+                <a:ext uri="{FF2B5EF4-FFF2-40B4-BE49-F238E27FC236}">
+                  <a16:creationId xmlns:a16="http://schemas.microsoft.com/office/drawing/2014/main" id="{0EFC2DB3-E602-699B-94CC-C138A83CD460}"/>
+                </a:ext>
+              </a:extLst>
+            </p:cNvPr>
+            <p:cNvSpPr txBox="1"/>
+            <p:nvPr/>
+          </p:nvSpPr>
+          <p:spPr>
+            <a:xfrm>
+              <a:off x="5905144" y="2320183"/>
+              <a:ext cx="308098" cy="369332"/>
+            </a:xfrm>
+            <a:prstGeom prst="rect">
+              <a:avLst/>
+            </a:prstGeom>
+            <a:noFill/>
+          </p:spPr>
+          <p:txBody>
+            <a:bodyPr wrap="none" rtlCol="0">
+              <a:spAutoFit/>
+            </a:bodyPr>
+            <a:lstStyle/>
+            <a:p>
+              <a:r>
+                <a:rPr lang="de-DE" b="1" dirty="0">
+                  <a:solidFill>
+                    <a:srgbClr val="FF0000"/>
+                  </a:solidFill>
+                </a:rPr>
+                <a:t>0</a:t>
+              </a:r>
+            </a:p>
+          </p:txBody>
+        </p:sp>
+        <p:sp>
+          <p:nvSpPr>
+            <p:cNvPr id="78" name="Textfeld 77">
+              <a:extLst>
+                <a:ext uri="{FF2B5EF4-FFF2-40B4-BE49-F238E27FC236}">
+                  <a16:creationId xmlns:a16="http://schemas.microsoft.com/office/drawing/2014/main" id="{AD1F2E2D-8CF2-6093-4EF0-DA78E66F74F3}"/>
+                </a:ext>
+              </a:extLst>
+            </p:cNvPr>
+            <p:cNvSpPr txBox="1"/>
+            <p:nvPr/>
+          </p:nvSpPr>
+          <p:spPr>
+            <a:xfrm>
+              <a:off x="6305372" y="2549496"/>
+              <a:ext cx="308098" cy="369332"/>
+            </a:xfrm>
+            <a:prstGeom prst="rect">
+              <a:avLst/>
+            </a:prstGeom>
+            <a:noFill/>
+          </p:spPr>
+          <p:txBody>
+            <a:bodyPr wrap="none" rtlCol="0">
+              <a:spAutoFit/>
+            </a:bodyPr>
+            <a:lstStyle/>
+            <a:p>
+              <a:r>
+                <a:rPr lang="de-DE" b="1" dirty="0">
+                  <a:solidFill>
+                    <a:srgbClr val="FF0000"/>
+                  </a:solidFill>
+                </a:rPr>
+                <a:t>1</a:t>
+              </a:r>
+            </a:p>
+          </p:txBody>
+        </p:sp>
+        <p:sp>
+          <p:nvSpPr>
+            <p:cNvPr id="79" name="Textfeld 78">
+              <a:extLst>
+                <a:ext uri="{FF2B5EF4-FFF2-40B4-BE49-F238E27FC236}">
+                  <a16:creationId xmlns:a16="http://schemas.microsoft.com/office/drawing/2014/main" id="{B64D45A7-6FDE-0D67-2AEB-BBE11A599484}"/>
+                </a:ext>
+              </a:extLst>
+            </p:cNvPr>
+            <p:cNvSpPr txBox="1"/>
+            <p:nvPr/>
+          </p:nvSpPr>
+          <p:spPr>
+            <a:xfrm>
+              <a:off x="6705600" y="2768346"/>
+              <a:ext cx="308098" cy="369332"/>
+            </a:xfrm>
+            <a:prstGeom prst="rect">
+              <a:avLst/>
+            </a:prstGeom>
+            <a:noFill/>
+          </p:spPr>
+          <p:txBody>
+            <a:bodyPr wrap="none" rtlCol="0">
+              <a:spAutoFit/>
+            </a:bodyPr>
+            <a:lstStyle/>
+            <a:p>
+              <a:r>
+                <a:rPr lang="de-DE" b="1" dirty="0">
+                  <a:solidFill>
+                    <a:srgbClr val="FF0000"/>
+                  </a:solidFill>
+                </a:rPr>
+                <a:t>2</a:t>
+              </a:r>
+            </a:p>
+          </p:txBody>
+        </p:sp>
+        <p:sp>
+          <p:nvSpPr>
+            <p:cNvPr id="80" name="Textfeld 79">
+              <a:extLst>
+                <a:ext uri="{FF2B5EF4-FFF2-40B4-BE49-F238E27FC236}">
+                  <a16:creationId xmlns:a16="http://schemas.microsoft.com/office/drawing/2014/main" id="{3ACDDB74-7B4B-3BC5-B6D7-AEA819BF4064}"/>
+                </a:ext>
+              </a:extLst>
+            </p:cNvPr>
+            <p:cNvSpPr txBox="1"/>
+            <p:nvPr/>
+          </p:nvSpPr>
+          <p:spPr>
+            <a:xfrm>
+              <a:off x="6704175" y="3222968"/>
+              <a:ext cx="308098" cy="369332"/>
+            </a:xfrm>
+            <a:prstGeom prst="rect">
+              <a:avLst/>
+            </a:prstGeom>
+            <a:noFill/>
+          </p:spPr>
+          <p:txBody>
+            <a:bodyPr wrap="none" rtlCol="0">
+              <a:spAutoFit/>
+            </a:bodyPr>
+            <a:lstStyle/>
+            <a:p>
+              <a:r>
+                <a:rPr lang="de-DE" b="1" dirty="0">
+                  <a:solidFill>
+                    <a:srgbClr val="FF0000"/>
+                  </a:solidFill>
+                </a:rPr>
+                <a:t>3</a:t>
+              </a:r>
+            </a:p>
+          </p:txBody>
+        </p:sp>
+        <p:sp>
+          <p:nvSpPr>
+            <p:cNvPr id="81" name="Textfeld 80">
+              <a:extLst>
+                <a:ext uri="{FF2B5EF4-FFF2-40B4-BE49-F238E27FC236}">
+                  <a16:creationId xmlns:a16="http://schemas.microsoft.com/office/drawing/2014/main" id="{AA2472A7-C5EE-3A61-4425-D98E249753AE}"/>
+                </a:ext>
+              </a:extLst>
+            </p:cNvPr>
+            <p:cNvSpPr txBox="1"/>
+            <p:nvPr/>
+          </p:nvSpPr>
+          <p:spPr>
+            <a:xfrm>
+              <a:off x="6704175" y="3677590"/>
+              <a:ext cx="308098" cy="369332"/>
+            </a:xfrm>
+            <a:prstGeom prst="rect">
+              <a:avLst/>
+            </a:prstGeom>
+            <a:noFill/>
+          </p:spPr>
+          <p:txBody>
+            <a:bodyPr wrap="none" rtlCol="0">
+              <a:spAutoFit/>
+            </a:bodyPr>
+            <a:lstStyle/>
+            <a:p>
+              <a:r>
+                <a:rPr lang="de-DE" b="1" dirty="0">
+                  <a:solidFill>
+                    <a:srgbClr val="FF0000"/>
+                  </a:solidFill>
+                </a:rPr>
+                <a:t>4</a:t>
+              </a:r>
+            </a:p>
+          </p:txBody>
+        </p:sp>
+        <p:sp>
+          <p:nvSpPr>
+            <p:cNvPr id="82" name="Textfeld 81">
+              <a:extLst>
+                <a:ext uri="{FF2B5EF4-FFF2-40B4-BE49-F238E27FC236}">
+                  <a16:creationId xmlns:a16="http://schemas.microsoft.com/office/drawing/2014/main" id="{D08982AF-DCC4-E737-71CC-30975A0076FE}"/>
+                </a:ext>
+              </a:extLst>
+            </p:cNvPr>
+            <p:cNvSpPr txBox="1"/>
+            <p:nvPr/>
+          </p:nvSpPr>
+          <p:spPr>
+            <a:xfrm>
+              <a:off x="6296826" y="3904986"/>
+              <a:ext cx="308098" cy="369332"/>
+            </a:xfrm>
+            <a:prstGeom prst="rect">
+              <a:avLst/>
+            </a:prstGeom>
+            <a:noFill/>
+          </p:spPr>
+          <p:txBody>
+            <a:bodyPr wrap="none" rtlCol="0">
+              <a:spAutoFit/>
+            </a:bodyPr>
+            <a:lstStyle/>
+            <a:p>
+              <a:r>
+                <a:rPr lang="de-DE" b="1" dirty="0">
+                  <a:solidFill>
+                    <a:srgbClr val="FF0000"/>
+                  </a:solidFill>
+                </a:rPr>
+                <a:t>5</a:t>
+              </a:r>
+            </a:p>
+          </p:txBody>
+        </p:sp>
+        <p:sp>
+          <p:nvSpPr>
+            <p:cNvPr id="83" name="Textfeld 82">
+              <a:extLst>
+                <a:ext uri="{FF2B5EF4-FFF2-40B4-BE49-F238E27FC236}">
+                  <a16:creationId xmlns:a16="http://schemas.microsoft.com/office/drawing/2014/main" id="{E36A6179-66A2-FE20-EA82-20BF0AA5817D}"/>
+                </a:ext>
+              </a:extLst>
+            </p:cNvPr>
+            <p:cNvSpPr txBox="1"/>
+            <p:nvPr/>
+          </p:nvSpPr>
+          <p:spPr>
+            <a:xfrm>
+              <a:off x="5905144" y="4151751"/>
+              <a:ext cx="308098" cy="369332"/>
+            </a:xfrm>
+            <a:prstGeom prst="rect">
+              <a:avLst/>
+            </a:prstGeom>
+            <a:noFill/>
+          </p:spPr>
+          <p:txBody>
+            <a:bodyPr wrap="none" rtlCol="0">
+              <a:spAutoFit/>
+            </a:bodyPr>
+            <a:lstStyle/>
+            <a:p>
+              <a:r>
+                <a:rPr lang="de-DE" b="1" dirty="0">
+                  <a:solidFill>
+                    <a:srgbClr val="FF0000"/>
+                  </a:solidFill>
+                </a:rPr>
+                <a:t>6</a:t>
+              </a:r>
+            </a:p>
+          </p:txBody>
+        </p:sp>
+        <p:sp>
+          <p:nvSpPr>
+            <p:cNvPr id="84" name="Textfeld 83">
+              <a:extLst>
+                <a:ext uri="{FF2B5EF4-FFF2-40B4-BE49-F238E27FC236}">
+                  <a16:creationId xmlns:a16="http://schemas.microsoft.com/office/drawing/2014/main" id="{B0AD84E6-6F11-4E9B-7A6D-F42905F3250C}"/>
+                </a:ext>
+              </a:extLst>
+            </p:cNvPr>
+            <p:cNvSpPr txBox="1"/>
+            <p:nvPr/>
+          </p:nvSpPr>
+          <p:spPr>
+            <a:xfrm>
+              <a:off x="5500644" y="3909259"/>
+              <a:ext cx="308098" cy="369332"/>
+            </a:xfrm>
+            <a:prstGeom prst="rect">
+              <a:avLst/>
+            </a:prstGeom>
+            <a:noFill/>
+          </p:spPr>
+          <p:txBody>
+            <a:bodyPr wrap="none" rtlCol="0">
+              <a:spAutoFit/>
+            </a:bodyPr>
+            <a:lstStyle/>
+            <a:p>
+              <a:r>
+                <a:rPr lang="de-DE" b="1" dirty="0">
+                  <a:solidFill>
+                    <a:srgbClr val="FF0000"/>
+                  </a:solidFill>
+                </a:rPr>
+                <a:t>7</a:t>
+              </a:r>
+            </a:p>
+          </p:txBody>
+        </p:sp>
+        <p:sp>
+          <p:nvSpPr>
+            <p:cNvPr id="85" name="Textfeld 84">
+              <a:extLst>
+                <a:ext uri="{FF2B5EF4-FFF2-40B4-BE49-F238E27FC236}">
+                  <a16:creationId xmlns:a16="http://schemas.microsoft.com/office/drawing/2014/main" id="{727C8A5F-ED1E-D626-07E1-CF00B071C068}"/>
+                </a:ext>
+              </a:extLst>
+            </p:cNvPr>
+            <p:cNvSpPr txBox="1"/>
+            <p:nvPr/>
+          </p:nvSpPr>
+          <p:spPr>
+            <a:xfrm>
+              <a:off x="5102553" y="3677590"/>
+              <a:ext cx="308098" cy="369332"/>
+            </a:xfrm>
+            <a:prstGeom prst="rect">
+              <a:avLst/>
+            </a:prstGeom>
+            <a:noFill/>
+          </p:spPr>
+          <p:txBody>
+            <a:bodyPr wrap="none" rtlCol="0">
+              <a:spAutoFit/>
+            </a:bodyPr>
+            <a:lstStyle/>
+            <a:p>
+              <a:r>
+                <a:rPr lang="de-DE" b="1" dirty="0">
+                  <a:solidFill>
+                    <a:srgbClr val="FF0000"/>
+                  </a:solidFill>
+                </a:rPr>
+                <a:t>8</a:t>
+              </a:r>
+            </a:p>
+          </p:txBody>
+        </p:sp>
+        <p:sp>
+          <p:nvSpPr>
+            <p:cNvPr id="86" name="Textfeld 85">
+              <a:extLst>
+                <a:ext uri="{FF2B5EF4-FFF2-40B4-BE49-F238E27FC236}">
+                  <a16:creationId xmlns:a16="http://schemas.microsoft.com/office/drawing/2014/main" id="{E5CED17B-4BAF-7F91-D15D-FB5C70718A81}"/>
+                </a:ext>
+              </a:extLst>
+            </p:cNvPr>
+            <p:cNvSpPr txBox="1"/>
+            <p:nvPr/>
+          </p:nvSpPr>
+          <p:spPr>
+            <a:xfrm>
+              <a:off x="5040838" y="2768346"/>
+              <a:ext cx="431528" cy="369332"/>
+            </a:xfrm>
+            <a:prstGeom prst="rect">
+              <a:avLst/>
+            </a:prstGeom>
+            <a:noFill/>
+          </p:spPr>
+          <p:txBody>
+            <a:bodyPr wrap="none" rtlCol="0">
+              <a:spAutoFit/>
+            </a:bodyPr>
+            <a:lstStyle/>
+            <a:p>
+              <a:r>
+                <a:rPr lang="de-DE" b="1" dirty="0">
+                  <a:solidFill>
+                    <a:srgbClr val="FF0000"/>
+                  </a:solidFill>
+                </a:rPr>
+                <a:t>10</a:t>
+              </a:r>
+            </a:p>
+          </p:txBody>
+        </p:sp>
+        <p:sp>
+          <p:nvSpPr>
+            <p:cNvPr id="87" name="Textfeld 86">
+              <a:extLst>
+                <a:ext uri="{FF2B5EF4-FFF2-40B4-BE49-F238E27FC236}">
+                  <a16:creationId xmlns:a16="http://schemas.microsoft.com/office/drawing/2014/main" id="{C695CEC2-132A-78C1-EDDC-7B324B03D5F5}"/>
+                </a:ext>
+              </a:extLst>
+            </p:cNvPr>
+            <p:cNvSpPr txBox="1"/>
+            <p:nvPr/>
+          </p:nvSpPr>
+          <p:spPr>
+            <a:xfrm>
+              <a:off x="5438929" y="2549496"/>
+              <a:ext cx="431528" cy="369332"/>
+            </a:xfrm>
+            <a:prstGeom prst="rect">
+              <a:avLst/>
+            </a:prstGeom>
+            <a:noFill/>
+          </p:spPr>
+          <p:txBody>
+            <a:bodyPr wrap="none" rtlCol="0">
+              <a:spAutoFit/>
+            </a:bodyPr>
+            <a:lstStyle/>
+            <a:p>
+              <a:r>
+                <a:rPr lang="de-DE" b="1" dirty="0">
+                  <a:solidFill>
+                    <a:srgbClr val="FF0000"/>
+                  </a:solidFill>
+                </a:rPr>
+                <a:t>11</a:t>
+              </a:r>
+            </a:p>
+          </p:txBody>
+        </p:sp>
+        <p:sp>
+          <p:nvSpPr>
+            <p:cNvPr id="88" name="Textfeld 87">
+              <a:extLst>
+                <a:ext uri="{FF2B5EF4-FFF2-40B4-BE49-F238E27FC236}">
+                  <a16:creationId xmlns:a16="http://schemas.microsoft.com/office/drawing/2014/main" id="{45676990-4224-7DE4-4E8E-86C93A881BA5}"/>
+                </a:ext>
+              </a:extLst>
+            </p:cNvPr>
+            <p:cNvSpPr txBox="1"/>
+            <p:nvPr/>
+          </p:nvSpPr>
+          <p:spPr>
+            <a:xfrm>
+              <a:off x="5101338" y="3222968"/>
+              <a:ext cx="308098" cy="369332"/>
+            </a:xfrm>
+            <a:prstGeom prst="rect">
+              <a:avLst/>
+            </a:prstGeom>
+            <a:noFill/>
+          </p:spPr>
+          <p:txBody>
+            <a:bodyPr wrap="none" rtlCol="0">
+              <a:spAutoFit/>
+            </a:bodyPr>
+            <a:lstStyle/>
+            <a:p>
+              <a:r>
+                <a:rPr lang="de-DE" b="1" dirty="0">
+                  <a:solidFill>
+                    <a:srgbClr val="FF0000"/>
+                  </a:solidFill>
+                </a:rPr>
+                <a:t>9</a:t>
+              </a:r>
+            </a:p>
+          </p:txBody>
+        </p:sp>
+      </p:grpSp>
+      <p:grpSp>
+        <p:nvGrpSpPr>
+          <p:cNvPr id="89" name="Gruppieren 88">
+            <a:extLst>
+              <a:ext uri="{FF2B5EF4-FFF2-40B4-BE49-F238E27FC236}">
+                <a16:creationId xmlns:a16="http://schemas.microsoft.com/office/drawing/2014/main" id="{E1EF4C86-CCD8-13D2-F05B-C0191BF62940}"/>
+              </a:ext>
+            </a:extLst>
+          </p:cNvPr>
+          <p:cNvGrpSpPr/>
+          <p:nvPr/>
+        </p:nvGrpSpPr>
+        <p:grpSpPr>
+          <a:xfrm>
+            <a:off x="5367115" y="180341"/>
+            <a:ext cx="1972860" cy="2200900"/>
+            <a:chOff x="5040838" y="2320183"/>
+            <a:chExt cx="1972860" cy="2200900"/>
+          </a:xfrm>
+        </p:grpSpPr>
+        <p:sp>
+          <p:nvSpPr>
+            <p:cNvPr id="90" name="Textfeld 89">
+              <a:extLst>
+                <a:ext uri="{FF2B5EF4-FFF2-40B4-BE49-F238E27FC236}">
+                  <a16:creationId xmlns:a16="http://schemas.microsoft.com/office/drawing/2014/main" id="{961AEA6E-27AB-9A85-A515-E0A80238D2BA}"/>
+                </a:ext>
+              </a:extLst>
+            </p:cNvPr>
+            <p:cNvSpPr txBox="1"/>
+            <p:nvPr/>
+          </p:nvSpPr>
+          <p:spPr>
+            <a:xfrm>
+              <a:off x="5905144" y="2320183"/>
+              <a:ext cx="308098" cy="369332"/>
+            </a:xfrm>
+            <a:prstGeom prst="rect">
+              <a:avLst/>
+            </a:prstGeom>
+            <a:noFill/>
+          </p:spPr>
+          <p:txBody>
+            <a:bodyPr wrap="none" rtlCol="0">
+              <a:spAutoFit/>
+            </a:bodyPr>
+            <a:lstStyle/>
+            <a:p>
+              <a:r>
+                <a:rPr lang="de-DE" b="1" dirty="0">
+                  <a:solidFill>
+                    <a:srgbClr val="FF0000"/>
+                  </a:solidFill>
+                </a:rPr>
+                <a:t>0</a:t>
+              </a:r>
+            </a:p>
+          </p:txBody>
+        </p:sp>
+        <p:sp>
+          <p:nvSpPr>
+            <p:cNvPr id="91" name="Textfeld 90">
+              <a:extLst>
+                <a:ext uri="{FF2B5EF4-FFF2-40B4-BE49-F238E27FC236}">
+                  <a16:creationId xmlns:a16="http://schemas.microsoft.com/office/drawing/2014/main" id="{9A9D0B58-A659-BC94-730C-0793B6220103}"/>
+                </a:ext>
+              </a:extLst>
+            </p:cNvPr>
+            <p:cNvSpPr txBox="1"/>
+            <p:nvPr/>
+          </p:nvSpPr>
+          <p:spPr>
+            <a:xfrm>
+              <a:off x="6305372" y="2549496"/>
+              <a:ext cx="308098" cy="369332"/>
+            </a:xfrm>
+            <a:prstGeom prst="rect">
+              <a:avLst/>
+            </a:prstGeom>
+            <a:noFill/>
+          </p:spPr>
+          <p:txBody>
+            <a:bodyPr wrap="none" rtlCol="0">
+              <a:spAutoFit/>
+            </a:bodyPr>
+            <a:lstStyle/>
+            <a:p>
+              <a:r>
+                <a:rPr lang="de-DE" b="1" dirty="0">
+                  <a:solidFill>
+                    <a:srgbClr val="FF0000"/>
+                  </a:solidFill>
+                </a:rPr>
+                <a:t>1</a:t>
+              </a:r>
+            </a:p>
+          </p:txBody>
+        </p:sp>
+        <p:sp>
+          <p:nvSpPr>
+            <p:cNvPr id="92" name="Textfeld 91">
+              <a:extLst>
+                <a:ext uri="{FF2B5EF4-FFF2-40B4-BE49-F238E27FC236}">
+                  <a16:creationId xmlns:a16="http://schemas.microsoft.com/office/drawing/2014/main" id="{D38BE2F9-7874-0BE5-194F-EA6A24429EE9}"/>
+                </a:ext>
+              </a:extLst>
+            </p:cNvPr>
+            <p:cNvSpPr txBox="1"/>
+            <p:nvPr/>
+          </p:nvSpPr>
+          <p:spPr>
+            <a:xfrm>
+              <a:off x="6705600" y="2768346"/>
+              <a:ext cx="308098" cy="369332"/>
+            </a:xfrm>
+            <a:prstGeom prst="rect">
+              <a:avLst/>
+            </a:prstGeom>
+            <a:noFill/>
+          </p:spPr>
+          <p:txBody>
+            <a:bodyPr wrap="none" rtlCol="0">
+              <a:spAutoFit/>
+            </a:bodyPr>
+            <a:lstStyle/>
+            <a:p>
+              <a:r>
+                <a:rPr lang="de-DE" b="1" dirty="0">
+                  <a:solidFill>
+                    <a:srgbClr val="FF0000"/>
+                  </a:solidFill>
+                </a:rPr>
+                <a:t>2</a:t>
+              </a:r>
+            </a:p>
+          </p:txBody>
+        </p:sp>
+        <p:sp>
+          <p:nvSpPr>
+            <p:cNvPr id="93" name="Textfeld 92">
+              <a:extLst>
+                <a:ext uri="{FF2B5EF4-FFF2-40B4-BE49-F238E27FC236}">
+                  <a16:creationId xmlns:a16="http://schemas.microsoft.com/office/drawing/2014/main" id="{95D7916C-7D57-387D-9482-23B9CED5F1F4}"/>
+                </a:ext>
+              </a:extLst>
+            </p:cNvPr>
+            <p:cNvSpPr txBox="1"/>
+            <p:nvPr/>
+          </p:nvSpPr>
+          <p:spPr>
+            <a:xfrm>
+              <a:off x="6704175" y="3222968"/>
+              <a:ext cx="308098" cy="369332"/>
+            </a:xfrm>
+            <a:prstGeom prst="rect">
+              <a:avLst/>
+            </a:prstGeom>
+            <a:noFill/>
+          </p:spPr>
+          <p:txBody>
+            <a:bodyPr wrap="none" rtlCol="0">
+              <a:spAutoFit/>
+            </a:bodyPr>
+            <a:lstStyle/>
+            <a:p>
+              <a:r>
+                <a:rPr lang="de-DE" b="1" dirty="0">
+                  <a:solidFill>
+                    <a:srgbClr val="FF0000"/>
+                  </a:solidFill>
+                </a:rPr>
+                <a:t>3</a:t>
+              </a:r>
+            </a:p>
+          </p:txBody>
+        </p:sp>
+        <p:sp>
+          <p:nvSpPr>
+            <p:cNvPr id="94" name="Textfeld 93">
+              <a:extLst>
+                <a:ext uri="{FF2B5EF4-FFF2-40B4-BE49-F238E27FC236}">
+                  <a16:creationId xmlns:a16="http://schemas.microsoft.com/office/drawing/2014/main" id="{9D85A487-5915-8ED7-C83B-C4B6D2E960D3}"/>
+                </a:ext>
+              </a:extLst>
+            </p:cNvPr>
+            <p:cNvSpPr txBox="1"/>
+            <p:nvPr/>
+          </p:nvSpPr>
+          <p:spPr>
+            <a:xfrm>
+              <a:off x="6704175" y="3677590"/>
+              <a:ext cx="308098" cy="369332"/>
+            </a:xfrm>
+            <a:prstGeom prst="rect">
+              <a:avLst/>
+            </a:prstGeom>
+            <a:noFill/>
+          </p:spPr>
+          <p:txBody>
+            <a:bodyPr wrap="none" rtlCol="0">
+              <a:spAutoFit/>
+            </a:bodyPr>
+            <a:lstStyle/>
+            <a:p>
+              <a:r>
+                <a:rPr lang="de-DE" b="1" dirty="0">
+                  <a:solidFill>
+                    <a:srgbClr val="FF0000"/>
+                  </a:solidFill>
+                </a:rPr>
+                <a:t>4</a:t>
+              </a:r>
+            </a:p>
+          </p:txBody>
+        </p:sp>
+        <p:sp>
+          <p:nvSpPr>
+            <p:cNvPr id="95" name="Textfeld 94">
+              <a:extLst>
+                <a:ext uri="{FF2B5EF4-FFF2-40B4-BE49-F238E27FC236}">
+                  <a16:creationId xmlns:a16="http://schemas.microsoft.com/office/drawing/2014/main" id="{E7A8880C-275B-7BE4-9098-848E184082C7}"/>
+                </a:ext>
+              </a:extLst>
+            </p:cNvPr>
+            <p:cNvSpPr txBox="1"/>
+            <p:nvPr/>
+          </p:nvSpPr>
+          <p:spPr>
+            <a:xfrm>
+              <a:off x="6296826" y="3904986"/>
+              <a:ext cx="308098" cy="369332"/>
+            </a:xfrm>
+            <a:prstGeom prst="rect">
+              <a:avLst/>
+            </a:prstGeom>
+            <a:noFill/>
+          </p:spPr>
+          <p:txBody>
+            <a:bodyPr wrap="none" rtlCol="0">
+              <a:spAutoFit/>
+            </a:bodyPr>
+            <a:lstStyle/>
+            <a:p>
+              <a:r>
+                <a:rPr lang="de-DE" b="1" dirty="0">
+                  <a:solidFill>
+                    <a:srgbClr val="FF0000"/>
+                  </a:solidFill>
+                </a:rPr>
+                <a:t>5</a:t>
+              </a:r>
+            </a:p>
+          </p:txBody>
+        </p:sp>
+        <p:sp>
+          <p:nvSpPr>
+            <p:cNvPr id="96" name="Textfeld 95">
+              <a:extLst>
+                <a:ext uri="{FF2B5EF4-FFF2-40B4-BE49-F238E27FC236}">
+                  <a16:creationId xmlns:a16="http://schemas.microsoft.com/office/drawing/2014/main" id="{0F4CF063-CFB8-C2AD-4CFD-429615A52A1B}"/>
+                </a:ext>
+              </a:extLst>
+            </p:cNvPr>
+            <p:cNvSpPr txBox="1"/>
+            <p:nvPr/>
+          </p:nvSpPr>
+          <p:spPr>
+            <a:xfrm>
+              <a:off x="5905144" y="4151751"/>
+              <a:ext cx="308098" cy="369332"/>
+            </a:xfrm>
+            <a:prstGeom prst="rect">
+              <a:avLst/>
+            </a:prstGeom>
+            <a:noFill/>
+          </p:spPr>
+          <p:txBody>
+            <a:bodyPr wrap="none" rtlCol="0">
+              <a:spAutoFit/>
+            </a:bodyPr>
+            <a:lstStyle/>
+            <a:p>
+              <a:r>
+                <a:rPr lang="de-DE" b="1" dirty="0">
+                  <a:solidFill>
+                    <a:srgbClr val="FF0000"/>
+                  </a:solidFill>
+                </a:rPr>
+                <a:t>6</a:t>
+              </a:r>
+            </a:p>
+          </p:txBody>
+        </p:sp>
+        <p:sp>
+          <p:nvSpPr>
+            <p:cNvPr id="97" name="Textfeld 96">
+              <a:extLst>
+                <a:ext uri="{FF2B5EF4-FFF2-40B4-BE49-F238E27FC236}">
+                  <a16:creationId xmlns:a16="http://schemas.microsoft.com/office/drawing/2014/main" id="{EDC131DE-57B4-DCA4-A61B-2C3B30410F5D}"/>
+                </a:ext>
+              </a:extLst>
+            </p:cNvPr>
+            <p:cNvSpPr txBox="1"/>
+            <p:nvPr/>
+          </p:nvSpPr>
+          <p:spPr>
+            <a:xfrm>
+              <a:off x="5500644" y="3909259"/>
+              <a:ext cx="308098" cy="369332"/>
+            </a:xfrm>
+            <a:prstGeom prst="rect">
+              <a:avLst/>
+            </a:prstGeom>
+            <a:noFill/>
+          </p:spPr>
+          <p:txBody>
+            <a:bodyPr wrap="none" rtlCol="0">
+              <a:spAutoFit/>
+            </a:bodyPr>
+            <a:lstStyle/>
+            <a:p>
+              <a:r>
+                <a:rPr lang="de-DE" b="1" dirty="0">
+                  <a:solidFill>
+                    <a:srgbClr val="FF0000"/>
+                  </a:solidFill>
+                </a:rPr>
+                <a:t>7</a:t>
+              </a:r>
+            </a:p>
+          </p:txBody>
+        </p:sp>
+        <p:sp>
+          <p:nvSpPr>
+            <p:cNvPr id="98" name="Textfeld 97">
+              <a:extLst>
+                <a:ext uri="{FF2B5EF4-FFF2-40B4-BE49-F238E27FC236}">
+                  <a16:creationId xmlns:a16="http://schemas.microsoft.com/office/drawing/2014/main" id="{9FD79118-FC2A-B722-08F2-08D064960088}"/>
+                </a:ext>
+              </a:extLst>
+            </p:cNvPr>
+            <p:cNvSpPr txBox="1"/>
+            <p:nvPr/>
+          </p:nvSpPr>
+          <p:spPr>
+            <a:xfrm>
+              <a:off x="5102553" y="3677590"/>
+              <a:ext cx="308098" cy="369332"/>
+            </a:xfrm>
+            <a:prstGeom prst="rect">
+              <a:avLst/>
+            </a:prstGeom>
+            <a:noFill/>
+          </p:spPr>
+          <p:txBody>
+            <a:bodyPr wrap="none" rtlCol="0">
+              <a:spAutoFit/>
+            </a:bodyPr>
+            <a:lstStyle/>
+            <a:p>
+              <a:r>
+                <a:rPr lang="de-DE" b="1" dirty="0">
+                  <a:solidFill>
+                    <a:srgbClr val="FF0000"/>
+                  </a:solidFill>
+                </a:rPr>
+                <a:t>8</a:t>
+              </a:r>
+            </a:p>
+          </p:txBody>
+        </p:sp>
+        <p:sp>
+          <p:nvSpPr>
+            <p:cNvPr id="99" name="Textfeld 98">
+              <a:extLst>
+                <a:ext uri="{FF2B5EF4-FFF2-40B4-BE49-F238E27FC236}">
+                  <a16:creationId xmlns:a16="http://schemas.microsoft.com/office/drawing/2014/main" id="{27B8FB31-A03F-5D1B-9525-72836D46D375}"/>
+                </a:ext>
+              </a:extLst>
+            </p:cNvPr>
+            <p:cNvSpPr txBox="1"/>
+            <p:nvPr/>
+          </p:nvSpPr>
+          <p:spPr>
+            <a:xfrm>
+              <a:off x="5040838" y="2768346"/>
+              <a:ext cx="431528" cy="369332"/>
+            </a:xfrm>
+            <a:prstGeom prst="rect">
+              <a:avLst/>
+            </a:prstGeom>
+            <a:noFill/>
+          </p:spPr>
+          <p:txBody>
+            <a:bodyPr wrap="none" rtlCol="0">
+              <a:spAutoFit/>
+            </a:bodyPr>
+            <a:lstStyle/>
+            <a:p>
+              <a:r>
+                <a:rPr lang="de-DE" b="1" dirty="0">
+                  <a:solidFill>
+                    <a:srgbClr val="FF0000"/>
+                  </a:solidFill>
+                </a:rPr>
+                <a:t>10</a:t>
+              </a:r>
+            </a:p>
+          </p:txBody>
+        </p:sp>
+        <p:sp>
+          <p:nvSpPr>
+            <p:cNvPr id="100" name="Textfeld 99">
+              <a:extLst>
+                <a:ext uri="{FF2B5EF4-FFF2-40B4-BE49-F238E27FC236}">
+                  <a16:creationId xmlns:a16="http://schemas.microsoft.com/office/drawing/2014/main" id="{6BACA681-79FB-CC87-D42E-3C55A89CB6AF}"/>
+                </a:ext>
+              </a:extLst>
+            </p:cNvPr>
+            <p:cNvSpPr txBox="1"/>
+            <p:nvPr/>
+          </p:nvSpPr>
+          <p:spPr>
+            <a:xfrm>
+              <a:off x="5438929" y="2549496"/>
+              <a:ext cx="431528" cy="369332"/>
+            </a:xfrm>
+            <a:prstGeom prst="rect">
+              <a:avLst/>
+            </a:prstGeom>
+            <a:noFill/>
+          </p:spPr>
+          <p:txBody>
+            <a:bodyPr wrap="none" rtlCol="0">
+              <a:spAutoFit/>
+            </a:bodyPr>
+            <a:lstStyle/>
+            <a:p>
+              <a:r>
+                <a:rPr lang="de-DE" b="1" dirty="0">
+                  <a:solidFill>
+                    <a:srgbClr val="FF0000"/>
+                  </a:solidFill>
+                </a:rPr>
+                <a:t>11</a:t>
+              </a:r>
+            </a:p>
+          </p:txBody>
+        </p:sp>
+        <p:sp>
+          <p:nvSpPr>
+            <p:cNvPr id="101" name="Textfeld 100">
+              <a:extLst>
+                <a:ext uri="{FF2B5EF4-FFF2-40B4-BE49-F238E27FC236}">
+                  <a16:creationId xmlns:a16="http://schemas.microsoft.com/office/drawing/2014/main" id="{EBF034D2-8E27-F577-F909-B4CE7933BBBE}"/>
+                </a:ext>
+              </a:extLst>
+            </p:cNvPr>
+            <p:cNvSpPr txBox="1"/>
+            <p:nvPr/>
+          </p:nvSpPr>
+          <p:spPr>
+            <a:xfrm>
+              <a:off x="5101338" y="3222968"/>
+              <a:ext cx="308098" cy="369332"/>
+            </a:xfrm>
+            <a:prstGeom prst="rect">
+              <a:avLst/>
+            </a:prstGeom>
+            <a:noFill/>
+          </p:spPr>
+          <p:txBody>
+            <a:bodyPr wrap="none" rtlCol="0">
+              <a:spAutoFit/>
+            </a:bodyPr>
+            <a:lstStyle/>
+            <a:p>
+              <a:r>
+                <a:rPr lang="de-DE" b="1" dirty="0">
+                  <a:solidFill>
+                    <a:srgbClr val="FF0000"/>
+                  </a:solidFill>
+                </a:rPr>
+                <a:t>9</a:t>
+              </a:r>
+            </a:p>
+          </p:txBody>
+        </p:sp>
+      </p:grpSp>
+    </p:spTree>
+    <p:extLst>
+      <p:ext uri="{BB962C8B-B14F-4D97-AF65-F5344CB8AC3E}">
+        <p14:creationId xmlns:p14="http://schemas.microsoft.com/office/powerpoint/2010/main" val="1197939760"/>
+      </p:ext>
+    </p:extLst>
+  </p:cSld>
+  <p:clrMapOvr>
+    <a:masterClrMapping/>
+  </p:clrMapOvr>
+</p:sld>
+</file>
+
 <file path=ppt/theme/theme1.xml><?xml version="1.0" encoding="utf-8"?>
 <a:theme xmlns:a="http://schemas.openxmlformats.org/drawingml/2006/main" name="Office">
   <a:themeElements>

</xml_diff>